<commit_message>
Last min changes to session 1 presentation
</commit_message>
<xml_diff>
--- a/Session 1/Python - Session 1 May 2019.pptx
+++ b/Session 1/Python - Session 1 May 2019.pptx
@@ -8385,15 +8385,123 @@
               <a:buChar char=""/>
             </a:pPr>
             <a:r>
-              <a:rPr lang="fr-FR" sz="1600" b="0" strike="noStrike" spc="-1">
+              <a:rPr lang="fr-FR" sz="1600" b="0" strike="noStrike" spc="-1" dirty="0">
                 <a:solidFill>
                   <a:srgbClr val="000000"/>
                 </a:solidFill>
                 <a:latin typeface="Calibri"/>
               </a:rPr>
-              <a:t>A loop statement allows us to execute a statement or group of statements multiple times</a:t>
-            </a:r>
-            <a:endParaRPr lang="fr-FR" sz="1600" b="0" strike="noStrike" spc="-1">
+              <a:t>A </a:t>
+            </a:r>
+            <a:r>
+              <a:rPr lang="fr-FR" sz="1600" b="0" strike="noStrike" spc="-1" dirty="0" err="1">
+                <a:solidFill>
+                  <a:srgbClr val="000000"/>
+                </a:solidFill>
+                <a:latin typeface="Calibri"/>
+              </a:rPr>
+              <a:t>loop</a:t>
+            </a:r>
+            <a:r>
+              <a:rPr lang="fr-FR" sz="1600" b="0" strike="noStrike" spc="-1" dirty="0">
+                <a:solidFill>
+                  <a:srgbClr val="000000"/>
+                </a:solidFill>
+                <a:latin typeface="Calibri"/>
+              </a:rPr>
+              <a:t> </a:t>
+            </a:r>
+            <a:r>
+              <a:rPr lang="fr-FR" sz="1600" b="0" strike="noStrike" spc="-1" dirty="0" err="1">
+                <a:solidFill>
+                  <a:srgbClr val="000000"/>
+                </a:solidFill>
+                <a:latin typeface="Calibri"/>
+              </a:rPr>
+              <a:t>statement</a:t>
+            </a:r>
+            <a:r>
+              <a:rPr lang="fr-FR" sz="1600" b="0" strike="noStrike" spc="-1" dirty="0">
+                <a:solidFill>
+                  <a:srgbClr val="000000"/>
+                </a:solidFill>
+                <a:latin typeface="Calibri"/>
+              </a:rPr>
+              <a:t> </a:t>
+            </a:r>
+            <a:r>
+              <a:rPr lang="fr-FR" sz="1600" b="0" strike="noStrike" spc="-1" dirty="0" err="1">
+                <a:solidFill>
+                  <a:srgbClr val="000000"/>
+                </a:solidFill>
+                <a:latin typeface="Calibri"/>
+              </a:rPr>
+              <a:t>allows</a:t>
+            </a:r>
+            <a:r>
+              <a:rPr lang="fr-FR" sz="1600" b="0" strike="noStrike" spc="-1" dirty="0">
+                <a:solidFill>
+                  <a:srgbClr val="000000"/>
+                </a:solidFill>
+                <a:latin typeface="Calibri"/>
+              </a:rPr>
+              <a:t> us to </a:t>
+            </a:r>
+            <a:r>
+              <a:rPr lang="fr-FR" sz="1600" b="0" strike="noStrike" spc="-1" dirty="0" err="1">
+                <a:solidFill>
+                  <a:srgbClr val="000000"/>
+                </a:solidFill>
+                <a:latin typeface="Calibri"/>
+              </a:rPr>
+              <a:t>execute</a:t>
+            </a:r>
+            <a:r>
+              <a:rPr lang="fr-FR" sz="1600" b="0" strike="noStrike" spc="-1" dirty="0">
+                <a:solidFill>
+                  <a:srgbClr val="000000"/>
+                </a:solidFill>
+                <a:latin typeface="Calibri"/>
+              </a:rPr>
+              <a:t> a </a:t>
+            </a:r>
+            <a:r>
+              <a:rPr lang="fr-FR" sz="1600" b="0" strike="noStrike" spc="-1" dirty="0" err="1">
+                <a:solidFill>
+                  <a:srgbClr val="000000"/>
+                </a:solidFill>
+                <a:latin typeface="Calibri"/>
+              </a:rPr>
+              <a:t>statement</a:t>
+            </a:r>
+            <a:r>
+              <a:rPr lang="fr-FR" sz="1600" b="0" strike="noStrike" spc="-1" dirty="0">
+                <a:solidFill>
+                  <a:srgbClr val="000000"/>
+                </a:solidFill>
+                <a:latin typeface="Calibri"/>
+              </a:rPr>
+              <a:t> or group of </a:t>
+            </a:r>
+            <a:r>
+              <a:rPr lang="fr-FR" sz="1600" b="0" strike="noStrike" spc="-1" dirty="0" err="1">
+                <a:solidFill>
+                  <a:srgbClr val="000000"/>
+                </a:solidFill>
+                <a:latin typeface="Calibri"/>
+              </a:rPr>
+              <a:t>statements</a:t>
+            </a:r>
+            <a:r>
+              <a:rPr lang="fr-FR" sz="1600" b="0" strike="noStrike" spc="-1" dirty="0">
+                <a:solidFill>
+                  <a:srgbClr val="000000"/>
+                </a:solidFill>
+                <a:latin typeface="Calibri"/>
+              </a:rPr>
+              <a:t> multiple times</a:t>
+            </a:r>
+            <a:endParaRPr lang="fr-FR" sz="1600" b="0" strike="noStrike" spc="-1" dirty="0">
               <a:solidFill>
                 <a:srgbClr val="000000"/>
               </a:solidFill>
@@ -8415,15 +8523,177 @@
               <a:buChar char=""/>
             </a:pPr>
             <a:r>
-              <a:rPr lang="fr-FR" sz="1600" b="0" strike="noStrike" spc="-1">
+              <a:rPr lang="fr-FR" sz="1600" b="0" strike="noStrike" spc="-1" dirty="0" err="1">
                 <a:solidFill>
                   <a:srgbClr val="000000"/>
                 </a:solidFill>
                 <a:latin typeface="Calibri"/>
               </a:rPr>
-              <a:t>While loop is the simplest loop which executes a block of code until and expression is True</a:t>
-            </a:r>
-            <a:endParaRPr lang="fr-FR" sz="1600" b="0" strike="noStrike" spc="-1">
+              <a:t>While</a:t>
+            </a:r>
+            <a:r>
+              <a:rPr lang="fr-FR" sz="1600" b="0" strike="noStrike" spc="-1" dirty="0">
+                <a:solidFill>
+                  <a:srgbClr val="000000"/>
+                </a:solidFill>
+                <a:latin typeface="Calibri"/>
+              </a:rPr>
+              <a:t> </a:t>
+            </a:r>
+            <a:r>
+              <a:rPr lang="fr-FR" sz="1600" b="0" strike="noStrike" spc="-1" dirty="0" err="1">
+                <a:solidFill>
+                  <a:srgbClr val="000000"/>
+                </a:solidFill>
+                <a:latin typeface="Calibri"/>
+              </a:rPr>
+              <a:t>loop</a:t>
+            </a:r>
+            <a:r>
+              <a:rPr lang="fr-FR" sz="1600" b="0" strike="noStrike" spc="-1" dirty="0">
+                <a:solidFill>
+                  <a:srgbClr val="000000"/>
+                </a:solidFill>
+                <a:latin typeface="Calibri"/>
+              </a:rPr>
+              <a:t> </a:t>
+            </a:r>
+            <a:r>
+              <a:rPr lang="fr-FR" sz="1600" b="0" strike="noStrike" spc="-1" dirty="0" err="1">
+                <a:solidFill>
+                  <a:srgbClr val="000000"/>
+                </a:solidFill>
+                <a:latin typeface="Calibri"/>
+              </a:rPr>
+              <a:t>is</a:t>
+            </a:r>
+            <a:r>
+              <a:rPr lang="fr-FR" sz="1600" b="0" strike="noStrike" spc="-1" dirty="0">
+                <a:solidFill>
+                  <a:srgbClr val="000000"/>
+                </a:solidFill>
+                <a:latin typeface="Calibri"/>
+              </a:rPr>
+              <a:t> the </a:t>
+            </a:r>
+            <a:r>
+              <a:rPr lang="fr-FR" sz="1600" b="0" strike="noStrike" spc="-1" dirty="0" err="1">
+                <a:solidFill>
+                  <a:srgbClr val="000000"/>
+                </a:solidFill>
+                <a:latin typeface="Calibri"/>
+              </a:rPr>
+              <a:t>simplest</a:t>
+            </a:r>
+            <a:r>
+              <a:rPr lang="fr-FR" sz="1600" b="0" strike="noStrike" spc="-1" dirty="0">
+                <a:solidFill>
+                  <a:srgbClr val="000000"/>
+                </a:solidFill>
+                <a:latin typeface="Calibri"/>
+              </a:rPr>
+              <a:t> </a:t>
+            </a:r>
+            <a:r>
+              <a:rPr lang="fr-FR" sz="1600" b="0" strike="noStrike" spc="-1" dirty="0" err="1">
+                <a:solidFill>
+                  <a:srgbClr val="000000"/>
+                </a:solidFill>
+                <a:latin typeface="Calibri"/>
+              </a:rPr>
+              <a:t>loop</a:t>
+            </a:r>
+            <a:r>
+              <a:rPr lang="fr-FR" sz="1600" b="0" strike="noStrike" spc="-1" dirty="0">
+                <a:solidFill>
+                  <a:srgbClr val="000000"/>
+                </a:solidFill>
+                <a:latin typeface="Calibri"/>
+              </a:rPr>
+              <a:t> </a:t>
+            </a:r>
+            <a:r>
+              <a:rPr lang="fr-FR" sz="1600" b="0" strike="noStrike" spc="-1" dirty="0" err="1">
+                <a:solidFill>
+                  <a:srgbClr val="000000"/>
+                </a:solidFill>
+                <a:latin typeface="Calibri"/>
+              </a:rPr>
+              <a:t>which</a:t>
+            </a:r>
+            <a:r>
+              <a:rPr lang="fr-FR" sz="1600" b="0" strike="noStrike" spc="-1" dirty="0">
+                <a:solidFill>
+                  <a:srgbClr val="000000"/>
+                </a:solidFill>
+                <a:latin typeface="Calibri"/>
+              </a:rPr>
+              <a:t> </a:t>
+            </a:r>
+            <a:r>
+              <a:rPr lang="fr-FR" sz="1600" b="0" strike="noStrike" spc="-1" dirty="0" err="1">
+                <a:solidFill>
+                  <a:srgbClr val="000000"/>
+                </a:solidFill>
+                <a:latin typeface="Calibri"/>
+              </a:rPr>
+              <a:t>executes</a:t>
+            </a:r>
+            <a:r>
+              <a:rPr lang="fr-FR" sz="1600" b="0" strike="noStrike" spc="-1" dirty="0">
+                <a:solidFill>
+                  <a:srgbClr val="000000"/>
+                </a:solidFill>
+                <a:latin typeface="Calibri"/>
+              </a:rPr>
+              <a:t> a block of code </a:t>
+            </a:r>
+            <a:r>
+              <a:rPr lang="fr-FR" sz="1600" b="0" strike="noStrike" spc="-1" dirty="0" err="1">
+                <a:solidFill>
+                  <a:srgbClr val="000000"/>
+                </a:solidFill>
+                <a:latin typeface="Calibri"/>
+              </a:rPr>
+              <a:t>until</a:t>
+            </a:r>
+            <a:r>
+              <a:rPr lang="fr-FR" sz="1600" b="0" strike="noStrike" spc="-1" dirty="0">
+                <a:solidFill>
+                  <a:srgbClr val="000000"/>
+                </a:solidFill>
+                <a:latin typeface="Calibri"/>
+              </a:rPr>
+              <a:t> and expression </a:t>
+            </a:r>
+            <a:r>
+              <a:rPr lang="fr-FR" sz="1600" b="0" strike="noStrike" spc="-1" dirty="0" err="1">
+                <a:solidFill>
+                  <a:srgbClr val="000000"/>
+                </a:solidFill>
+                <a:latin typeface="Calibri"/>
+              </a:rPr>
+              <a:t>is</a:t>
+            </a:r>
+            <a:r>
+              <a:rPr lang="fr-FR" sz="1600" b="0" strike="noStrike" spc="-1" dirty="0">
+                <a:solidFill>
+                  <a:srgbClr val="000000"/>
+                </a:solidFill>
+                <a:latin typeface="Calibri"/>
+              </a:rPr>
+              <a:t> </a:t>
+            </a:r>
+            <a:r>
+              <a:rPr lang="fr-FR" sz="1600" b="0" strike="noStrike" spc="-1" dirty="0" err="1">
+                <a:solidFill>
+                  <a:srgbClr val="000000"/>
+                </a:solidFill>
+                <a:latin typeface="Calibri"/>
+              </a:rPr>
+              <a:t>True</a:t>
+            </a:r>
+            <a:endParaRPr lang="fr-FR" sz="1600" b="0" strike="noStrike" spc="-1" dirty="0">
               <a:solidFill>
                 <a:srgbClr val="000000"/>
               </a:solidFill>
@@ -8445,15 +8715,96 @@
               <a:buChar char=""/>
             </a:pPr>
             <a:r>
-              <a:rPr lang="fr-FR" sz="1600" b="0" strike="noStrike" spc="-1">
+              <a:rPr lang="fr-FR" sz="1600" b="0" strike="noStrike" spc="-1" dirty="0">
                 <a:solidFill>
                   <a:srgbClr val="000000"/>
                 </a:solidFill>
                 <a:latin typeface="Calibri"/>
               </a:rPr>
-              <a:t>A 'break' command can be used to exit any loop prematurely</a:t>
-            </a:r>
-            <a:endParaRPr lang="fr-FR" sz="1600" b="0" strike="noStrike" spc="-1">
+              <a:t>A 'break' command can </a:t>
+            </a:r>
+            <a:r>
+              <a:rPr lang="fr-FR" sz="1600" b="0" strike="noStrike" spc="-1" dirty="0" err="1">
+                <a:solidFill>
+                  <a:srgbClr val="000000"/>
+                </a:solidFill>
+                <a:latin typeface="Calibri"/>
+              </a:rPr>
+              <a:t>be</a:t>
+            </a:r>
+            <a:r>
+              <a:rPr lang="fr-FR" sz="1600" b="0" strike="noStrike" spc="-1" dirty="0">
+                <a:solidFill>
+                  <a:srgbClr val="000000"/>
+                </a:solidFill>
+                <a:latin typeface="Calibri"/>
+              </a:rPr>
+              <a:t> </a:t>
+            </a:r>
+            <a:r>
+              <a:rPr lang="fr-FR" sz="1600" b="0" strike="noStrike" spc="-1" dirty="0" err="1">
+                <a:solidFill>
+                  <a:srgbClr val="000000"/>
+                </a:solidFill>
+                <a:latin typeface="Calibri"/>
+              </a:rPr>
+              <a:t>used</a:t>
+            </a:r>
+            <a:r>
+              <a:rPr lang="fr-FR" sz="1600" b="0" strike="noStrike" spc="-1" dirty="0">
+                <a:solidFill>
+                  <a:srgbClr val="000000"/>
+                </a:solidFill>
+                <a:latin typeface="Calibri"/>
+              </a:rPr>
+              <a:t> to exit </a:t>
+            </a:r>
+            <a:r>
+              <a:rPr lang="fr-FR" sz="1600" b="0" strike="noStrike" spc="-1" dirty="0" err="1">
+                <a:solidFill>
+                  <a:srgbClr val="000000"/>
+                </a:solidFill>
+                <a:latin typeface="Calibri"/>
+              </a:rPr>
+              <a:t>any</a:t>
+            </a:r>
+            <a:r>
+              <a:rPr lang="fr-FR" sz="1600" b="0" strike="noStrike" spc="-1" dirty="0">
+                <a:solidFill>
+                  <a:srgbClr val="000000"/>
+                </a:solidFill>
+                <a:latin typeface="Calibri"/>
+              </a:rPr>
+              <a:t> </a:t>
+            </a:r>
+            <a:r>
+              <a:rPr lang="fr-FR" sz="1600" b="0" strike="noStrike" spc="-1" dirty="0" err="1">
+                <a:solidFill>
+                  <a:srgbClr val="000000"/>
+                </a:solidFill>
+                <a:latin typeface="Calibri"/>
+              </a:rPr>
+              <a:t>loop</a:t>
+            </a:r>
+            <a:r>
+              <a:rPr lang="fr-FR" sz="1600" b="0" strike="noStrike" spc="-1" dirty="0">
+                <a:solidFill>
+                  <a:srgbClr val="000000"/>
+                </a:solidFill>
+                <a:latin typeface="Calibri"/>
+              </a:rPr>
+              <a:t> </a:t>
+            </a:r>
+            <a:r>
+              <a:rPr lang="fr-FR" sz="1600" b="0" strike="noStrike" spc="-1" dirty="0" err="1">
+                <a:solidFill>
+                  <a:srgbClr val="000000"/>
+                </a:solidFill>
+                <a:latin typeface="Calibri"/>
+              </a:rPr>
+              <a:t>prematurely</a:t>
+            </a:r>
+            <a:endParaRPr lang="fr-FR" sz="1600" b="0" strike="noStrike" spc="-1" dirty="0">
               <a:solidFill>
                 <a:srgbClr val="000000"/>
               </a:solidFill>
@@ -8475,15 +8826,150 @@
               <a:buChar char=""/>
             </a:pPr>
             <a:r>
-              <a:rPr lang="fr-FR" sz="1600" b="0" strike="noStrike" spc="-1">
+              <a:rPr lang="fr-FR" sz="1600" b="0" strike="noStrike" spc="-1" dirty="0">
                 <a:solidFill>
                   <a:srgbClr val="000000"/>
                 </a:solidFill>
                 <a:latin typeface="Calibri"/>
               </a:rPr>
-              <a:t>A 'continue' command can be used to skip ahead to the next iterations without exiting the loop</a:t>
-            </a:r>
-            <a:endParaRPr lang="fr-FR" sz="1600" b="0" strike="noStrike" spc="-1">
+              <a:t>A 'continue' command can </a:t>
+            </a:r>
+            <a:r>
+              <a:rPr lang="fr-FR" sz="1600" b="0" strike="noStrike" spc="-1" dirty="0" err="1">
+                <a:solidFill>
+                  <a:srgbClr val="000000"/>
+                </a:solidFill>
+                <a:latin typeface="Calibri"/>
+              </a:rPr>
+              <a:t>be</a:t>
+            </a:r>
+            <a:r>
+              <a:rPr lang="fr-FR" sz="1600" b="0" strike="noStrike" spc="-1" dirty="0">
+                <a:solidFill>
+                  <a:srgbClr val="000000"/>
+                </a:solidFill>
+                <a:latin typeface="Calibri"/>
+              </a:rPr>
+              <a:t> </a:t>
+            </a:r>
+            <a:r>
+              <a:rPr lang="fr-FR" sz="1600" b="0" strike="noStrike" spc="-1" dirty="0" err="1">
+                <a:solidFill>
+                  <a:srgbClr val="000000"/>
+                </a:solidFill>
+                <a:latin typeface="Calibri"/>
+              </a:rPr>
+              <a:t>used</a:t>
+            </a:r>
+            <a:r>
+              <a:rPr lang="fr-FR" sz="1600" b="0" strike="noStrike" spc="-1" dirty="0">
+                <a:solidFill>
+                  <a:srgbClr val="000000"/>
+                </a:solidFill>
+                <a:latin typeface="Calibri"/>
+              </a:rPr>
+              <a:t> to skip </a:t>
+            </a:r>
+            <a:r>
+              <a:rPr lang="fr-FR" sz="1600" b="0" strike="noStrike" spc="-1" dirty="0" err="1">
+                <a:solidFill>
+                  <a:srgbClr val="000000"/>
+                </a:solidFill>
+                <a:latin typeface="Calibri"/>
+              </a:rPr>
+              <a:t>ahead</a:t>
+            </a:r>
+            <a:r>
+              <a:rPr lang="fr-FR" sz="1600" b="0" strike="noStrike" spc="-1" dirty="0">
+                <a:solidFill>
+                  <a:srgbClr val="000000"/>
+                </a:solidFill>
+                <a:latin typeface="Calibri"/>
+              </a:rPr>
+              <a:t> to the </a:t>
+            </a:r>
+            <a:r>
+              <a:rPr lang="fr-FR" sz="1600" b="0" strike="noStrike" spc="-1" dirty="0" err="1">
+                <a:solidFill>
+                  <a:srgbClr val="000000"/>
+                </a:solidFill>
+                <a:latin typeface="Calibri"/>
+              </a:rPr>
+              <a:t>next</a:t>
+            </a:r>
+            <a:r>
+              <a:rPr lang="fr-FR" sz="1600" b="0" strike="noStrike" spc="-1" dirty="0">
+                <a:solidFill>
+                  <a:srgbClr val="000000"/>
+                </a:solidFill>
+                <a:latin typeface="Calibri"/>
+              </a:rPr>
+              <a:t> </a:t>
+            </a:r>
+            <a:r>
+              <a:rPr lang="fr-FR" sz="1600" b="0" strike="noStrike" spc="-1" dirty="0" err="1">
+                <a:solidFill>
+                  <a:srgbClr val="000000"/>
+                </a:solidFill>
+                <a:latin typeface="Calibri"/>
+              </a:rPr>
+              <a:t>iterations</a:t>
+            </a:r>
+            <a:r>
+              <a:rPr lang="fr-FR" sz="1600" b="0" strike="noStrike" spc="-1" dirty="0">
+                <a:solidFill>
+                  <a:srgbClr val="000000"/>
+                </a:solidFill>
+                <a:latin typeface="Calibri"/>
+              </a:rPr>
+              <a:t> </a:t>
+            </a:r>
+            <a:r>
+              <a:rPr lang="fr-FR" sz="1600" b="0" strike="noStrike" spc="-1" dirty="0" err="1">
+                <a:solidFill>
+                  <a:srgbClr val="000000"/>
+                </a:solidFill>
+                <a:latin typeface="Calibri"/>
+              </a:rPr>
+              <a:t>without</a:t>
+            </a:r>
+            <a:r>
+              <a:rPr lang="fr-FR" sz="1600" b="0" strike="noStrike" spc="-1" dirty="0">
+                <a:solidFill>
+                  <a:srgbClr val="000000"/>
+                </a:solidFill>
+                <a:latin typeface="Calibri"/>
+              </a:rPr>
+              <a:t> </a:t>
+            </a:r>
+            <a:r>
+              <a:rPr lang="fr-FR" sz="1600" b="0" strike="noStrike" spc="-1" dirty="0" err="1">
+                <a:solidFill>
+                  <a:srgbClr val="000000"/>
+                </a:solidFill>
+                <a:latin typeface="Calibri"/>
+              </a:rPr>
+              <a:t>exiting</a:t>
+            </a:r>
+            <a:r>
+              <a:rPr lang="fr-FR" sz="1600" b="0" strike="noStrike" spc="-1" dirty="0">
+                <a:solidFill>
+                  <a:srgbClr val="000000"/>
+                </a:solidFill>
+                <a:latin typeface="Calibri"/>
+              </a:rPr>
+              <a:t> the </a:t>
+            </a:r>
+            <a:r>
+              <a:rPr lang="fr-FR" sz="1600" b="0" strike="noStrike" spc="-1" dirty="0" err="1">
+                <a:solidFill>
+                  <a:srgbClr val="000000"/>
+                </a:solidFill>
+                <a:latin typeface="Calibri"/>
+              </a:rPr>
+              <a:t>loop</a:t>
+            </a:r>
+            <a:endParaRPr lang="fr-FR" sz="1600" b="0" strike="noStrike" spc="-1" dirty="0">
               <a:solidFill>
                 <a:srgbClr val="000000"/>
               </a:solidFill>
@@ -10550,7 +11036,7 @@
             </a:r>
           </a:p>
           <a:p>
-            <a:pPr marL="514440" indent="-514080">
+            <a:pPr marL="971640" lvl="1" indent="-514080">
               <a:lnSpc>
                 <a:spcPct val="150000"/>
               </a:lnSpc>
@@ -10774,7 +11260,7 @@
                 </a:solidFill>
                 <a:latin typeface="Gill Sans"/>
               </a:rPr>
-              <a:t>Programing</a:t>
+              <a:t>Programming</a:t>
             </a:r>
             <a:r>
               <a:rPr lang="fr-FR" sz="3200" b="1" strike="noStrike" cap="all" spc="-1" dirty="0">
@@ -10881,6 +11367,31 @@
               <a:latin typeface="Calibri" panose="020F0502020204030204" pitchFamily="34" charset="0"/>
               <a:cs typeface="Calibri" panose="020F0502020204030204" pitchFamily="34" charset="0"/>
             </a:endParaRPr>
+          </a:p>
+          <a:p>
+            <a:pPr marL="971640" lvl="1" indent="-514080">
+              <a:lnSpc>
+                <a:spcPct val="150000"/>
+              </a:lnSpc>
+              <a:spcBef>
+                <a:spcPts val="320"/>
+              </a:spcBef>
+              <a:buClr>
+                <a:srgbClr val="139CF8"/>
+              </a:buClr>
+              <a:buFont typeface="Wingdings" charset="2"/>
+              <a:buChar char=""/>
+            </a:pPr>
+            <a:r>
+              <a:rPr lang="en-IN" sz="1600" b="0" strike="noStrike" spc="-1" dirty="0">
+                <a:solidFill>
+                  <a:srgbClr val="000000"/>
+                </a:solidFill>
+                <a:latin typeface="Calibri" panose="020F0502020204030204" pitchFamily="34" charset="0"/>
+                <a:cs typeface="Calibri" panose="020F0502020204030204" pitchFamily="34" charset="0"/>
+              </a:rPr>
+              <a:t>Example: C++, Python</a:t>
+            </a:r>
           </a:p>
           <a:p>
             <a:pPr marL="971640" lvl="1" indent="-514080">
@@ -11114,15 +11625,141 @@
               <a:buChar char=""/>
             </a:pPr>
             <a:r>
-              <a:rPr lang="fr-FR" sz="1600" b="0" strike="noStrike" spc="-1">
+              <a:rPr lang="fr-FR" sz="1600" b="0" strike="noStrike" spc="-1" dirty="0">
                 <a:solidFill>
                   <a:srgbClr val="000000"/>
                 </a:solidFill>
                 <a:latin typeface="Calibri"/>
               </a:rPr>
-              <a:t>Block of organized, reusable code that is used to perform a single, related action </a:t>
-            </a:r>
-            <a:endParaRPr lang="fr-FR" sz="1600" b="0" strike="noStrike" spc="-1">
+              <a:t>Block of </a:t>
+            </a:r>
+            <a:r>
+              <a:rPr lang="fr-FR" sz="1600" b="0" strike="noStrike" spc="-1" dirty="0" err="1">
+                <a:solidFill>
+                  <a:srgbClr val="000000"/>
+                </a:solidFill>
+                <a:latin typeface="Calibri"/>
+              </a:rPr>
+              <a:t>organized</a:t>
+            </a:r>
+            <a:r>
+              <a:rPr lang="fr-FR" sz="1600" b="0" strike="noStrike" spc="-1" dirty="0">
+                <a:solidFill>
+                  <a:srgbClr val="000000"/>
+                </a:solidFill>
+                <a:latin typeface="Calibri"/>
+              </a:rPr>
+              <a:t>, </a:t>
+            </a:r>
+            <a:r>
+              <a:rPr lang="fr-FR" sz="1600" b="0" strike="noStrike" spc="-1" dirty="0" err="1">
+                <a:solidFill>
+                  <a:srgbClr val="000000"/>
+                </a:solidFill>
+                <a:latin typeface="Calibri"/>
+              </a:rPr>
+              <a:t>reusable</a:t>
+            </a:r>
+            <a:r>
+              <a:rPr lang="fr-FR" sz="1600" b="0" strike="noStrike" spc="-1" dirty="0">
+                <a:solidFill>
+                  <a:srgbClr val="000000"/>
+                </a:solidFill>
+                <a:latin typeface="Calibri"/>
+              </a:rPr>
+              <a:t> code </a:t>
+            </a:r>
+            <a:r>
+              <a:rPr lang="fr-FR" sz="1600" b="0" strike="noStrike" spc="-1" dirty="0" err="1">
+                <a:solidFill>
+                  <a:srgbClr val="000000"/>
+                </a:solidFill>
+                <a:latin typeface="Calibri"/>
+              </a:rPr>
+              <a:t>that</a:t>
+            </a:r>
+            <a:r>
+              <a:rPr lang="fr-FR" sz="1600" b="0" strike="noStrike" spc="-1" dirty="0">
+                <a:solidFill>
+                  <a:srgbClr val="000000"/>
+                </a:solidFill>
+                <a:latin typeface="Calibri"/>
+              </a:rPr>
+              <a:t> </a:t>
+            </a:r>
+            <a:r>
+              <a:rPr lang="fr-FR" sz="1600" b="0" strike="noStrike" spc="-1" dirty="0" err="1">
+                <a:solidFill>
+                  <a:srgbClr val="000000"/>
+                </a:solidFill>
+                <a:latin typeface="Calibri"/>
+              </a:rPr>
+              <a:t>is</a:t>
+            </a:r>
+            <a:r>
+              <a:rPr lang="fr-FR" sz="1600" b="0" strike="noStrike" spc="-1" dirty="0">
+                <a:solidFill>
+                  <a:srgbClr val="000000"/>
+                </a:solidFill>
+                <a:latin typeface="Calibri"/>
+              </a:rPr>
+              <a:t> </a:t>
+            </a:r>
+            <a:r>
+              <a:rPr lang="fr-FR" sz="1600" b="0" strike="noStrike" spc="-1" dirty="0" err="1">
+                <a:solidFill>
+                  <a:srgbClr val="000000"/>
+                </a:solidFill>
+                <a:latin typeface="Calibri"/>
+              </a:rPr>
+              <a:t>used</a:t>
+            </a:r>
+            <a:r>
+              <a:rPr lang="fr-FR" sz="1600" b="0" strike="noStrike" spc="-1" dirty="0">
+                <a:solidFill>
+                  <a:srgbClr val="000000"/>
+                </a:solidFill>
+                <a:latin typeface="Calibri"/>
+              </a:rPr>
+              <a:t> to </a:t>
+            </a:r>
+            <a:r>
+              <a:rPr lang="fr-FR" sz="1600" b="0" strike="noStrike" spc="-1" dirty="0" err="1">
+                <a:solidFill>
+                  <a:srgbClr val="000000"/>
+                </a:solidFill>
+                <a:latin typeface="Calibri"/>
+              </a:rPr>
+              <a:t>perform</a:t>
+            </a:r>
+            <a:r>
+              <a:rPr lang="fr-FR" sz="1600" b="0" strike="noStrike" spc="-1" dirty="0">
+                <a:solidFill>
+                  <a:srgbClr val="000000"/>
+                </a:solidFill>
+                <a:latin typeface="Calibri"/>
+              </a:rPr>
+              <a:t> a single, </a:t>
+            </a:r>
+            <a:r>
+              <a:rPr lang="fr-FR" sz="1600" b="0" strike="noStrike" spc="-1" dirty="0" err="1">
+                <a:solidFill>
+                  <a:srgbClr val="000000"/>
+                </a:solidFill>
+                <a:latin typeface="Calibri"/>
+              </a:rPr>
+              <a:t>related</a:t>
+            </a:r>
+            <a:r>
+              <a:rPr lang="fr-FR" sz="1600" b="0" strike="noStrike" spc="-1" dirty="0">
+                <a:solidFill>
+                  <a:srgbClr val="000000"/>
+                </a:solidFill>
+                <a:latin typeface="Calibri"/>
+              </a:rPr>
+              <a:t> action </a:t>
+            </a:r>
+            <a:endParaRPr lang="fr-FR" sz="1600" b="0" strike="noStrike" spc="-1" dirty="0">
               <a:solidFill>
                 <a:srgbClr val="000000"/>
               </a:solidFill>
@@ -11144,15 +11781,114 @@
               <a:buChar char=""/>
             </a:pPr>
             <a:r>
-              <a:rPr lang="fr-FR" sz="1600" b="0" strike="noStrike" spc="-1">
+              <a:rPr lang="fr-FR" sz="1600" b="0" strike="noStrike" spc="-1" dirty="0" err="1">
                 <a:solidFill>
                   <a:srgbClr val="000000"/>
                 </a:solidFill>
                 <a:latin typeface="Calibri"/>
               </a:rPr>
-              <a:t>Provide better modularity for your application and a high degree of code reusing </a:t>
-            </a:r>
-            <a:endParaRPr lang="fr-FR" sz="1600" b="0" strike="noStrike" spc="-1">
+              <a:t>Provide</a:t>
+            </a:r>
+            <a:r>
+              <a:rPr lang="fr-FR" sz="1600" b="0" strike="noStrike" spc="-1" dirty="0">
+                <a:solidFill>
+                  <a:srgbClr val="000000"/>
+                </a:solidFill>
+                <a:latin typeface="Calibri"/>
+              </a:rPr>
+              <a:t> </a:t>
+            </a:r>
+            <a:r>
+              <a:rPr lang="fr-FR" sz="1600" b="0" strike="noStrike" spc="-1" dirty="0" err="1">
+                <a:solidFill>
+                  <a:srgbClr val="000000"/>
+                </a:solidFill>
+                <a:latin typeface="Calibri"/>
+              </a:rPr>
+              <a:t>better</a:t>
+            </a:r>
+            <a:r>
+              <a:rPr lang="fr-FR" sz="1600" b="0" strike="noStrike" spc="-1" dirty="0">
+                <a:solidFill>
+                  <a:srgbClr val="000000"/>
+                </a:solidFill>
+                <a:latin typeface="Calibri"/>
+              </a:rPr>
+              <a:t> </a:t>
+            </a:r>
+            <a:r>
+              <a:rPr lang="fr-FR" sz="1600" b="0" strike="noStrike" spc="-1" dirty="0" err="1">
+                <a:solidFill>
+                  <a:srgbClr val="000000"/>
+                </a:solidFill>
+                <a:latin typeface="Calibri"/>
+              </a:rPr>
+              <a:t>modularity</a:t>
+            </a:r>
+            <a:r>
+              <a:rPr lang="fr-FR" sz="1600" b="0" strike="noStrike" spc="-1" dirty="0">
+                <a:solidFill>
+                  <a:srgbClr val="000000"/>
+                </a:solidFill>
+                <a:latin typeface="Calibri"/>
+              </a:rPr>
+              <a:t> for </a:t>
+            </a:r>
+            <a:r>
+              <a:rPr lang="fr-FR" sz="1600" b="0" strike="noStrike" spc="-1" dirty="0" err="1">
+                <a:solidFill>
+                  <a:srgbClr val="000000"/>
+                </a:solidFill>
+                <a:latin typeface="Calibri"/>
+              </a:rPr>
+              <a:t>your</a:t>
+            </a:r>
+            <a:r>
+              <a:rPr lang="fr-FR" sz="1600" b="0" strike="noStrike" spc="-1" dirty="0">
+                <a:solidFill>
+                  <a:srgbClr val="000000"/>
+                </a:solidFill>
+                <a:latin typeface="Calibri"/>
+              </a:rPr>
+              <a:t> application and a high </a:t>
+            </a:r>
+            <a:r>
+              <a:rPr lang="fr-FR" sz="1600" b="0" strike="noStrike" spc="-1" dirty="0" err="1">
+                <a:solidFill>
+                  <a:srgbClr val="000000"/>
+                </a:solidFill>
+                <a:latin typeface="Calibri"/>
+              </a:rPr>
+              <a:t>degree</a:t>
+            </a:r>
+            <a:r>
+              <a:rPr lang="fr-FR" sz="1600" b="0" strike="noStrike" spc="-1" dirty="0">
+                <a:solidFill>
+                  <a:srgbClr val="000000"/>
+                </a:solidFill>
+                <a:latin typeface="Calibri"/>
+              </a:rPr>
+              <a:t> of code </a:t>
+            </a:r>
+            <a:r>
+              <a:rPr lang="fr-FR" sz="1600" b="0" strike="noStrike" spc="-1" dirty="0" err="1">
+                <a:solidFill>
+                  <a:srgbClr val="000000"/>
+                </a:solidFill>
+                <a:latin typeface="Calibri"/>
+              </a:rPr>
+              <a:t>reusing</a:t>
+            </a:r>
+            <a:r>
+              <a:rPr lang="fr-FR" sz="1600" b="0" strike="noStrike" spc="-1" dirty="0">
+                <a:solidFill>
+                  <a:srgbClr val="000000"/>
+                </a:solidFill>
+                <a:latin typeface="Calibri"/>
+              </a:rPr>
+              <a:t> </a:t>
+            </a:r>
+            <a:endParaRPr lang="fr-FR" sz="1600" b="0" strike="noStrike" spc="-1" dirty="0">
               <a:solidFill>
                 <a:srgbClr val="000000"/>
               </a:solidFill>
@@ -11174,15 +11910,141 @@
               <a:buChar char=""/>
             </a:pPr>
             <a:r>
-              <a:rPr lang="fr-FR" sz="1600" b="0" strike="noStrike" spc="-1">
+              <a:rPr lang="fr-FR" sz="1600" b="0" strike="noStrike" spc="-1" dirty="0">
                 <a:solidFill>
                   <a:srgbClr val="000000"/>
                 </a:solidFill>
                 <a:latin typeface="Gill Sans"/>
               </a:rPr>
-              <a:t>Python gives you many built-in functions like print(), len() etc..</a:t>
-            </a:r>
-            <a:endParaRPr lang="fr-FR" sz="1600" b="0" strike="noStrike" spc="-1">
+              <a:t>Python </a:t>
+            </a:r>
+            <a:r>
+              <a:rPr lang="fr-FR" sz="1600" b="0" strike="noStrike" spc="-1" dirty="0" err="1">
+                <a:solidFill>
+                  <a:srgbClr val="000000"/>
+                </a:solidFill>
+                <a:latin typeface="Gill Sans"/>
+              </a:rPr>
+              <a:t>gives</a:t>
+            </a:r>
+            <a:r>
+              <a:rPr lang="fr-FR" sz="1600" b="0" strike="noStrike" spc="-1" dirty="0">
+                <a:solidFill>
+                  <a:srgbClr val="000000"/>
+                </a:solidFill>
+                <a:latin typeface="Gill Sans"/>
+              </a:rPr>
+              <a:t> </a:t>
+            </a:r>
+            <a:r>
+              <a:rPr lang="fr-FR" sz="1600" b="0" strike="noStrike" spc="-1" dirty="0" err="1">
+                <a:solidFill>
+                  <a:srgbClr val="000000"/>
+                </a:solidFill>
+                <a:latin typeface="Gill Sans"/>
+              </a:rPr>
+              <a:t>you</a:t>
+            </a:r>
+            <a:r>
+              <a:rPr lang="fr-FR" sz="1600" b="0" strike="noStrike" spc="-1" dirty="0">
+                <a:solidFill>
+                  <a:srgbClr val="000000"/>
+                </a:solidFill>
+                <a:latin typeface="Gill Sans"/>
+              </a:rPr>
+              <a:t> </a:t>
+            </a:r>
+            <a:r>
+              <a:rPr lang="fr-FR" sz="1600" b="0" strike="noStrike" spc="-1" dirty="0" err="1">
+                <a:solidFill>
+                  <a:srgbClr val="000000"/>
+                </a:solidFill>
+                <a:latin typeface="Gill Sans"/>
+              </a:rPr>
+              <a:t>many</a:t>
+            </a:r>
+            <a:r>
+              <a:rPr lang="fr-FR" sz="1600" b="0" strike="noStrike" spc="-1" dirty="0">
+                <a:solidFill>
+                  <a:srgbClr val="000000"/>
+                </a:solidFill>
+                <a:latin typeface="Gill Sans"/>
+              </a:rPr>
+              <a:t> </a:t>
+            </a:r>
+            <a:r>
+              <a:rPr lang="fr-FR" sz="1600" b="0" strike="noStrike" spc="-1" dirty="0" err="1">
+                <a:solidFill>
+                  <a:srgbClr val="000000"/>
+                </a:solidFill>
+                <a:latin typeface="Gill Sans"/>
+              </a:rPr>
+              <a:t>built-in</a:t>
+            </a:r>
+            <a:r>
+              <a:rPr lang="fr-FR" sz="1600" b="0" strike="noStrike" spc="-1" dirty="0">
+                <a:solidFill>
+                  <a:srgbClr val="000000"/>
+                </a:solidFill>
+                <a:latin typeface="Gill Sans"/>
+              </a:rPr>
+              <a:t> </a:t>
+            </a:r>
+            <a:r>
+              <a:rPr lang="fr-FR" sz="1600" b="0" strike="noStrike" spc="-1" dirty="0" err="1">
+                <a:solidFill>
+                  <a:srgbClr val="000000"/>
+                </a:solidFill>
+                <a:latin typeface="Gill Sans"/>
+              </a:rPr>
+              <a:t>functions</a:t>
+            </a:r>
+            <a:r>
+              <a:rPr lang="fr-FR" sz="1600" b="0" strike="noStrike" spc="-1" dirty="0">
+                <a:solidFill>
+                  <a:srgbClr val="000000"/>
+                </a:solidFill>
+                <a:latin typeface="Gill Sans"/>
+              </a:rPr>
+              <a:t> like </a:t>
+            </a:r>
+            <a:r>
+              <a:rPr lang="fr-FR" sz="1600" b="0" strike="noStrike" spc="-1" dirty="0" err="1">
+                <a:solidFill>
+                  <a:srgbClr val="000000"/>
+                </a:solidFill>
+                <a:latin typeface="Gill Sans"/>
+              </a:rPr>
+              <a:t>print</a:t>
+            </a:r>
+            <a:r>
+              <a:rPr lang="fr-FR" sz="1600" b="0" strike="noStrike" spc="-1" dirty="0">
+                <a:solidFill>
+                  <a:srgbClr val="000000"/>
+                </a:solidFill>
+                <a:latin typeface="Gill Sans"/>
+              </a:rPr>
+              <a:t>(), </a:t>
+            </a:r>
+            <a:r>
+              <a:rPr lang="fr-FR" sz="1600" b="0" strike="noStrike" spc="-1" dirty="0" err="1">
+                <a:solidFill>
+                  <a:srgbClr val="000000"/>
+                </a:solidFill>
+                <a:latin typeface="Gill Sans"/>
+              </a:rPr>
+              <a:t>len</a:t>
+            </a:r>
+            <a:r>
+              <a:rPr lang="fr-FR" sz="1600" b="0" strike="noStrike" spc="-1" dirty="0">
+                <a:solidFill>
+                  <a:srgbClr val="000000"/>
+                </a:solidFill>
+                <a:latin typeface="Gill Sans"/>
+              </a:rPr>
+              <a:t>() etc..</a:t>
+            </a:r>
+            <a:endParaRPr lang="fr-FR" sz="1600" b="0" strike="noStrike" spc="-1" dirty="0">
               <a:solidFill>
                 <a:srgbClr val="000000"/>
               </a:solidFill>
@@ -11204,15 +12066,96 @@
               <a:buChar char=""/>
             </a:pPr>
             <a:r>
-              <a:rPr lang="fr-FR" sz="1600" b="0" strike="noStrike" spc="-1">
+              <a:rPr lang="fr-FR" sz="1600" b="0" strike="noStrike" spc="-1" dirty="0">
                 <a:solidFill>
                   <a:srgbClr val="000000"/>
                 </a:solidFill>
                 <a:latin typeface="Calibri"/>
               </a:rPr>
-              <a:t>It is also possible to define user-defined functions</a:t>
-            </a:r>
-            <a:endParaRPr lang="fr-FR" sz="1600" b="0" strike="noStrike" spc="-1">
+              <a:t>It </a:t>
+            </a:r>
+            <a:r>
+              <a:rPr lang="fr-FR" sz="1600" b="0" strike="noStrike" spc="-1" dirty="0" err="1">
+                <a:solidFill>
+                  <a:srgbClr val="000000"/>
+                </a:solidFill>
+                <a:latin typeface="Calibri"/>
+              </a:rPr>
+              <a:t>is</a:t>
+            </a:r>
+            <a:r>
+              <a:rPr lang="fr-FR" sz="1600" b="0" strike="noStrike" spc="-1" dirty="0">
+                <a:solidFill>
+                  <a:srgbClr val="000000"/>
+                </a:solidFill>
+                <a:latin typeface="Calibri"/>
+              </a:rPr>
+              <a:t> </a:t>
+            </a:r>
+            <a:r>
+              <a:rPr lang="fr-FR" sz="1600" b="0" strike="noStrike" spc="-1" dirty="0" err="1">
+                <a:solidFill>
+                  <a:srgbClr val="000000"/>
+                </a:solidFill>
+                <a:latin typeface="Calibri"/>
+              </a:rPr>
+              <a:t>also</a:t>
+            </a:r>
+            <a:r>
+              <a:rPr lang="fr-FR" sz="1600" b="0" strike="noStrike" spc="-1" dirty="0">
+                <a:solidFill>
+                  <a:srgbClr val="000000"/>
+                </a:solidFill>
+                <a:latin typeface="Calibri"/>
+              </a:rPr>
+              <a:t> possible to </a:t>
+            </a:r>
+            <a:r>
+              <a:rPr lang="fr-FR" sz="1600" b="0" strike="noStrike" spc="-1" dirty="0" err="1">
+                <a:solidFill>
+                  <a:srgbClr val="000000"/>
+                </a:solidFill>
+                <a:latin typeface="Calibri"/>
+              </a:rPr>
+              <a:t>define</a:t>
+            </a:r>
+            <a:r>
+              <a:rPr lang="fr-FR" sz="1600" b="0" strike="noStrike" spc="-1" dirty="0">
+                <a:solidFill>
+                  <a:srgbClr val="000000"/>
+                </a:solidFill>
+                <a:latin typeface="Calibri"/>
+              </a:rPr>
+              <a:t> user-</a:t>
+            </a:r>
+            <a:r>
+              <a:rPr lang="fr-FR" sz="1600" b="0" strike="noStrike" spc="-1" dirty="0" err="1">
+                <a:solidFill>
+                  <a:srgbClr val="000000"/>
+                </a:solidFill>
+                <a:latin typeface="Calibri"/>
+              </a:rPr>
+              <a:t>defined</a:t>
+            </a:r>
+            <a:r>
+              <a:rPr lang="fr-FR" sz="1600" b="0" strike="noStrike" spc="-1" dirty="0">
+                <a:solidFill>
+                  <a:srgbClr val="000000"/>
+                </a:solidFill>
+                <a:latin typeface="Calibri"/>
+              </a:rPr>
+              <a:t> </a:t>
+            </a:r>
+            <a:r>
+              <a:rPr lang="fr-FR" sz="1600" b="0" strike="noStrike" spc="-1" dirty="0" err="1">
+                <a:solidFill>
+                  <a:srgbClr val="000000"/>
+                </a:solidFill>
+                <a:latin typeface="Calibri"/>
+              </a:rPr>
+              <a:t>functions</a:t>
+            </a:r>
+            <a:endParaRPr lang="fr-FR" sz="1600" b="0" strike="noStrike" spc="-1" dirty="0">
               <a:solidFill>
                 <a:srgbClr val="000000"/>
               </a:solidFill>
@@ -11546,7 +12489,7 @@
               <a:buChar char=""/>
             </a:pPr>
             <a:r>
-              <a:rPr lang="en-IN" sz="1600" b="0" strike="noStrike" spc="-1">
+              <a:rPr lang="en-IN" sz="1600" b="0" strike="noStrike" spc="-1" dirty="0">
                 <a:solidFill>
                   <a:srgbClr val="000000"/>
                 </a:solidFill>
@@ -11554,7 +12497,7 @@
               </a:rPr>
               <a:t>Evaluate expressions which produce TRUE or FALSE as outcome</a:t>
             </a:r>
-            <a:endParaRPr lang="en-IN" sz="1600" b="0" strike="noStrike" spc="-1">
+            <a:endParaRPr lang="en-IN" sz="1600" b="0" strike="noStrike" spc="-1" dirty="0">
               <a:latin typeface="Arial"/>
             </a:endParaRPr>
           </a:p>
@@ -11573,7 +12516,7 @@
               <a:buChar char=""/>
             </a:pPr>
             <a:r>
-              <a:rPr lang="en-IN" sz="1600" b="0" strike="noStrike" spc="-1">
+              <a:rPr lang="en-IN" sz="1600" b="0" strike="noStrike" spc="-1" dirty="0">
                 <a:solidFill>
                   <a:srgbClr val="000000"/>
                 </a:solidFill>
@@ -11581,7 +12524,7 @@
               </a:rPr>
               <a:t>Based on the outcome of the expression a specific block of code is executed</a:t>
             </a:r>
-            <a:endParaRPr lang="en-IN" sz="1600" b="0" strike="noStrike" spc="-1">
+            <a:endParaRPr lang="en-IN" sz="1600" b="0" strike="noStrike" spc="-1" dirty="0">
               <a:latin typeface="Arial"/>
             </a:endParaRPr>
           </a:p>
@@ -11600,7 +12543,7 @@
               <a:buChar char=""/>
             </a:pPr>
             <a:r>
-              <a:rPr lang="en-IN" sz="1600" b="0" strike="noStrike" spc="-1">
+              <a:rPr lang="en-IN" sz="1600" b="0" strike="noStrike" spc="-1" dirty="0">
                 <a:solidFill>
                   <a:srgbClr val="000000"/>
                 </a:solidFill>
@@ -11608,7 +12551,7 @@
               </a:rPr>
               <a:t>The expressions could be: equality (==) , inequality (!=), less/greater than (&lt;)(&gt;), less/greater than or equal  (&lt;=) (&gt;=), membership (in, not in)</a:t>
             </a:r>
-            <a:endParaRPr lang="en-IN" sz="1600" b="0" strike="noStrike" spc="-1">
+            <a:endParaRPr lang="en-IN" sz="1600" b="0" strike="noStrike" spc="-1" dirty="0">
               <a:latin typeface="Arial"/>
             </a:endParaRPr>
           </a:p>
@@ -11627,7 +12570,7 @@
               <a:buChar char=""/>
             </a:pPr>
             <a:r>
-              <a:rPr lang="en-IN" sz="1600" b="0" strike="noStrike" spc="-1">
+              <a:rPr lang="en-IN" sz="1600" b="0" strike="noStrike" spc="-1" dirty="0">
                 <a:solidFill>
                   <a:srgbClr val="000000"/>
                 </a:solidFill>
@@ -11635,7 +12578,7 @@
               </a:rPr>
               <a:t>Expressions can be combined using "and" and "or" and "and not"</a:t>
             </a:r>
-            <a:endParaRPr lang="en-IN" sz="1600" b="0" strike="noStrike" spc="-1">
+            <a:endParaRPr lang="en-IN" sz="1600" b="0" strike="noStrike" spc="-1" dirty="0">
               <a:latin typeface="Arial"/>
             </a:endParaRPr>
           </a:p>

</xml_diff>

<commit_message>
Changes after session 1
</commit_message>
<xml_diff>
--- a/Session 1/Python - Session 1 May 2019.pptx
+++ b/Session 1/Python - Session 1 May 2019.pptx
@@ -594,8 +594,8 @@
         </p:nvSpPr>
         <p:spPr>
           <a:xfrm>
-            <a:off x="914400" y="744480"/>
-            <a:ext cx="4965480" cy="3723840"/>
+            <a:off x="914400" y="744538"/>
+            <a:ext cx="4965700" cy="3724275"/>
           </a:xfrm>
           <a:prstGeom prst="rect">
             <a:avLst/>
@@ -990,8 +990,8 @@
         </p:nvSpPr>
         <p:spPr>
           <a:xfrm>
-            <a:off x="914400" y="744480"/>
-            <a:ext cx="4965480" cy="3723840"/>
+            <a:off x="914400" y="744538"/>
+            <a:ext cx="4965700" cy="3724275"/>
           </a:xfrm>
           <a:prstGeom prst="rect">
             <a:avLst/>
@@ -1111,8 +1111,8 @@
         </p:nvSpPr>
         <p:spPr>
           <a:xfrm>
-            <a:off x="914400" y="744480"/>
-            <a:ext cx="4965480" cy="3723840"/>
+            <a:off x="914400" y="744538"/>
+            <a:ext cx="4965700" cy="3724275"/>
           </a:xfrm>
           <a:prstGeom prst="rect">
             <a:avLst/>
@@ -1768,8 +1768,8 @@
         </p:nvSpPr>
         <p:spPr>
           <a:xfrm>
-            <a:off x="914400" y="744480"/>
-            <a:ext cx="4965480" cy="3723840"/>
+            <a:off x="914400" y="744538"/>
+            <a:ext cx="4965700" cy="3724275"/>
           </a:xfrm>
           <a:prstGeom prst="rect">
             <a:avLst/>
@@ -8385,123 +8385,15 @@
               <a:buChar char=""/>
             </a:pPr>
             <a:r>
-              <a:rPr lang="fr-FR" sz="1600" b="0" strike="noStrike" spc="-1" dirty="0">
+              <a:rPr lang="en-IN" sz="1600" b="0" strike="noStrike" spc="-1">
                 <a:solidFill>
                   <a:srgbClr val="000000"/>
                 </a:solidFill>
                 <a:latin typeface="Calibri"/>
               </a:rPr>
-              <a:t>A </a:t>
+              <a:t>A loop statement allows us to execute a statement or group of statements multiple times</a:t>
             </a:r>
-            <a:r>
-              <a:rPr lang="fr-FR" sz="1600" b="0" strike="noStrike" spc="-1" dirty="0" err="1">
-                <a:solidFill>
-                  <a:srgbClr val="000000"/>
-                </a:solidFill>
-                <a:latin typeface="Calibri"/>
-              </a:rPr>
-              <a:t>loop</a:t>
-            </a:r>
-            <a:r>
-              <a:rPr lang="fr-FR" sz="1600" b="0" strike="noStrike" spc="-1" dirty="0">
-                <a:solidFill>
-                  <a:srgbClr val="000000"/>
-                </a:solidFill>
-                <a:latin typeface="Calibri"/>
-              </a:rPr>
-              <a:t> </a:t>
-            </a:r>
-            <a:r>
-              <a:rPr lang="fr-FR" sz="1600" b="0" strike="noStrike" spc="-1" dirty="0" err="1">
-                <a:solidFill>
-                  <a:srgbClr val="000000"/>
-                </a:solidFill>
-                <a:latin typeface="Calibri"/>
-              </a:rPr>
-              <a:t>statement</a:t>
-            </a:r>
-            <a:r>
-              <a:rPr lang="fr-FR" sz="1600" b="0" strike="noStrike" spc="-1" dirty="0">
-                <a:solidFill>
-                  <a:srgbClr val="000000"/>
-                </a:solidFill>
-                <a:latin typeface="Calibri"/>
-              </a:rPr>
-              <a:t> </a:t>
-            </a:r>
-            <a:r>
-              <a:rPr lang="fr-FR" sz="1600" b="0" strike="noStrike" spc="-1" dirty="0" err="1">
-                <a:solidFill>
-                  <a:srgbClr val="000000"/>
-                </a:solidFill>
-                <a:latin typeface="Calibri"/>
-              </a:rPr>
-              <a:t>allows</a:t>
-            </a:r>
-            <a:r>
-              <a:rPr lang="fr-FR" sz="1600" b="0" strike="noStrike" spc="-1" dirty="0">
-                <a:solidFill>
-                  <a:srgbClr val="000000"/>
-                </a:solidFill>
-                <a:latin typeface="Calibri"/>
-              </a:rPr>
-              <a:t> us to </a:t>
-            </a:r>
-            <a:r>
-              <a:rPr lang="fr-FR" sz="1600" b="0" strike="noStrike" spc="-1" dirty="0" err="1">
-                <a:solidFill>
-                  <a:srgbClr val="000000"/>
-                </a:solidFill>
-                <a:latin typeface="Calibri"/>
-              </a:rPr>
-              <a:t>execute</a:t>
-            </a:r>
-            <a:r>
-              <a:rPr lang="fr-FR" sz="1600" b="0" strike="noStrike" spc="-1" dirty="0">
-                <a:solidFill>
-                  <a:srgbClr val="000000"/>
-                </a:solidFill>
-                <a:latin typeface="Calibri"/>
-              </a:rPr>
-              <a:t> a </a:t>
-            </a:r>
-            <a:r>
-              <a:rPr lang="fr-FR" sz="1600" b="0" strike="noStrike" spc="-1" dirty="0" err="1">
-                <a:solidFill>
-                  <a:srgbClr val="000000"/>
-                </a:solidFill>
-                <a:latin typeface="Calibri"/>
-              </a:rPr>
-              <a:t>statement</a:t>
-            </a:r>
-            <a:r>
-              <a:rPr lang="fr-FR" sz="1600" b="0" strike="noStrike" spc="-1" dirty="0">
-                <a:solidFill>
-                  <a:srgbClr val="000000"/>
-                </a:solidFill>
-                <a:latin typeface="Calibri"/>
-              </a:rPr>
-              <a:t> or group of </a:t>
-            </a:r>
-            <a:r>
-              <a:rPr lang="fr-FR" sz="1600" b="0" strike="noStrike" spc="-1" dirty="0" err="1">
-                <a:solidFill>
-                  <a:srgbClr val="000000"/>
-                </a:solidFill>
-                <a:latin typeface="Calibri"/>
-              </a:rPr>
-              <a:t>statements</a:t>
-            </a:r>
-            <a:r>
-              <a:rPr lang="fr-FR" sz="1600" b="0" strike="noStrike" spc="-1" dirty="0">
-                <a:solidFill>
-                  <a:srgbClr val="000000"/>
-                </a:solidFill>
-                <a:latin typeface="Calibri"/>
-              </a:rPr>
-              <a:t> multiple times</a:t>
-            </a:r>
-            <a:endParaRPr lang="fr-FR" sz="1600" b="0" strike="noStrike" spc="-1" dirty="0">
+            <a:endParaRPr lang="en-IN" sz="1600" b="0" strike="noStrike" spc="-1">
               <a:solidFill>
                 <a:srgbClr val="000000"/>
               </a:solidFill>
@@ -8523,177 +8415,15 @@
               <a:buChar char=""/>
             </a:pPr>
             <a:r>
-              <a:rPr lang="fr-FR" sz="1600" b="0" strike="noStrike" spc="-1" dirty="0" err="1">
+              <a:rPr lang="en-IN" sz="1600" b="0" strike="noStrike" spc="-1">
                 <a:solidFill>
                   <a:srgbClr val="000000"/>
                 </a:solidFill>
                 <a:latin typeface="Calibri"/>
               </a:rPr>
-              <a:t>While</a:t>
+              <a:t>While loop is the simplest loop which executes a block of code until and expression is True</a:t>
             </a:r>
-            <a:r>
-              <a:rPr lang="fr-FR" sz="1600" b="0" strike="noStrike" spc="-1" dirty="0">
-                <a:solidFill>
-                  <a:srgbClr val="000000"/>
-                </a:solidFill>
-                <a:latin typeface="Calibri"/>
-              </a:rPr>
-              <a:t> </a:t>
-            </a:r>
-            <a:r>
-              <a:rPr lang="fr-FR" sz="1600" b="0" strike="noStrike" spc="-1" dirty="0" err="1">
-                <a:solidFill>
-                  <a:srgbClr val="000000"/>
-                </a:solidFill>
-                <a:latin typeface="Calibri"/>
-              </a:rPr>
-              <a:t>loop</a:t>
-            </a:r>
-            <a:r>
-              <a:rPr lang="fr-FR" sz="1600" b="0" strike="noStrike" spc="-1" dirty="0">
-                <a:solidFill>
-                  <a:srgbClr val="000000"/>
-                </a:solidFill>
-                <a:latin typeface="Calibri"/>
-              </a:rPr>
-              <a:t> </a:t>
-            </a:r>
-            <a:r>
-              <a:rPr lang="fr-FR" sz="1600" b="0" strike="noStrike" spc="-1" dirty="0" err="1">
-                <a:solidFill>
-                  <a:srgbClr val="000000"/>
-                </a:solidFill>
-                <a:latin typeface="Calibri"/>
-              </a:rPr>
-              <a:t>is</a:t>
-            </a:r>
-            <a:r>
-              <a:rPr lang="fr-FR" sz="1600" b="0" strike="noStrike" spc="-1" dirty="0">
-                <a:solidFill>
-                  <a:srgbClr val="000000"/>
-                </a:solidFill>
-                <a:latin typeface="Calibri"/>
-              </a:rPr>
-              <a:t> the </a:t>
-            </a:r>
-            <a:r>
-              <a:rPr lang="fr-FR" sz="1600" b="0" strike="noStrike" spc="-1" dirty="0" err="1">
-                <a:solidFill>
-                  <a:srgbClr val="000000"/>
-                </a:solidFill>
-                <a:latin typeface="Calibri"/>
-              </a:rPr>
-              <a:t>simplest</a:t>
-            </a:r>
-            <a:r>
-              <a:rPr lang="fr-FR" sz="1600" b="0" strike="noStrike" spc="-1" dirty="0">
-                <a:solidFill>
-                  <a:srgbClr val="000000"/>
-                </a:solidFill>
-                <a:latin typeface="Calibri"/>
-              </a:rPr>
-              <a:t> </a:t>
-            </a:r>
-            <a:r>
-              <a:rPr lang="fr-FR" sz="1600" b="0" strike="noStrike" spc="-1" dirty="0" err="1">
-                <a:solidFill>
-                  <a:srgbClr val="000000"/>
-                </a:solidFill>
-                <a:latin typeface="Calibri"/>
-              </a:rPr>
-              <a:t>loop</a:t>
-            </a:r>
-            <a:r>
-              <a:rPr lang="fr-FR" sz="1600" b="0" strike="noStrike" spc="-1" dirty="0">
-                <a:solidFill>
-                  <a:srgbClr val="000000"/>
-                </a:solidFill>
-                <a:latin typeface="Calibri"/>
-              </a:rPr>
-              <a:t> </a:t>
-            </a:r>
-            <a:r>
-              <a:rPr lang="fr-FR" sz="1600" b="0" strike="noStrike" spc="-1" dirty="0" err="1">
-                <a:solidFill>
-                  <a:srgbClr val="000000"/>
-                </a:solidFill>
-                <a:latin typeface="Calibri"/>
-              </a:rPr>
-              <a:t>which</a:t>
-            </a:r>
-            <a:r>
-              <a:rPr lang="fr-FR" sz="1600" b="0" strike="noStrike" spc="-1" dirty="0">
-                <a:solidFill>
-                  <a:srgbClr val="000000"/>
-                </a:solidFill>
-                <a:latin typeface="Calibri"/>
-              </a:rPr>
-              <a:t> </a:t>
-            </a:r>
-            <a:r>
-              <a:rPr lang="fr-FR" sz="1600" b="0" strike="noStrike" spc="-1" dirty="0" err="1">
-                <a:solidFill>
-                  <a:srgbClr val="000000"/>
-                </a:solidFill>
-                <a:latin typeface="Calibri"/>
-              </a:rPr>
-              <a:t>executes</a:t>
-            </a:r>
-            <a:r>
-              <a:rPr lang="fr-FR" sz="1600" b="0" strike="noStrike" spc="-1" dirty="0">
-                <a:solidFill>
-                  <a:srgbClr val="000000"/>
-                </a:solidFill>
-                <a:latin typeface="Calibri"/>
-              </a:rPr>
-              <a:t> a block of code </a:t>
-            </a:r>
-            <a:r>
-              <a:rPr lang="fr-FR" sz="1600" b="0" strike="noStrike" spc="-1" dirty="0" err="1">
-                <a:solidFill>
-                  <a:srgbClr val="000000"/>
-                </a:solidFill>
-                <a:latin typeface="Calibri"/>
-              </a:rPr>
-              <a:t>until</a:t>
-            </a:r>
-            <a:r>
-              <a:rPr lang="fr-FR" sz="1600" b="0" strike="noStrike" spc="-1" dirty="0">
-                <a:solidFill>
-                  <a:srgbClr val="000000"/>
-                </a:solidFill>
-                <a:latin typeface="Calibri"/>
-              </a:rPr>
-              <a:t> and expression </a:t>
-            </a:r>
-            <a:r>
-              <a:rPr lang="fr-FR" sz="1600" b="0" strike="noStrike" spc="-1" dirty="0" err="1">
-                <a:solidFill>
-                  <a:srgbClr val="000000"/>
-                </a:solidFill>
-                <a:latin typeface="Calibri"/>
-              </a:rPr>
-              <a:t>is</a:t>
-            </a:r>
-            <a:r>
-              <a:rPr lang="fr-FR" sz="1600" b="0" strike="noStrike" spc="-1" dirty="0">
-                <a:solidFill>
-                  <a:srgbClr val="000000"/>
-                </a:solidFill>
-                <a:latin typeface="Calibri"/>
-              </a:rPr>
-              <a:t> </a:t>
-            </a:r>
-            <a:r>
-              <a:rPr lang="fr-FR" sz="1600" b="0" strike="noStrike" spc="-1" dirty="0" err="1">
-                <a:solidFill>
-                  <a:srgbClr val="000000"/>
-                </a:solidFill>
-                <a:latin typeface="Calibri"/>
-              </a:rPr>
-              <a:t>True</a:t>
-            </a:r>
-            <a:endParaRPr lang="fr-FR" sz="1600" b="0" strike="noStrike" spc="-1" dirty="0">
+            <a:endParaRPr lang="en-IN" sz="1600" b="0" strike="noStrike" spc="-1">
               <a:solidFill>
                 <a:srgbClr val="000000"/>
               </a:solidFill>
@@ -8715,96 +8445,15 @@
               <a:buChar char=""/>
             </a:pPr>
             <a:r>
-              <a:rPr lang="fr-FR" sz="1600" b="0" strike="noStrike" spc="-1" dirty="0">
+              <a:rPr lang="en-IN" sz="1600" b="0" strike="noStrike" spc="-1">
                 <a:solidFill>
                   <a:srgbClr val="000000"/>
                 </a:solidFill>
                 <a:latin typeface="Calibri"/>
               </a:rPr>
-              <a:t>A 'break' command can </a:t>
+              <a:t>A 'break' command can be used to exit any loop prematurely</a:t>
             </a:r>
-            <a:r>
-              <a:rPr lang="fr-FR" sz="1600" b="0" strike="noStrike" spc="-1" dirty="0" err="1">
-                <a:solidFill>
-                  <a:srgbClr val="000000"/>
-                </a:solidFill>
-                <a:latin typeface="Calibri"/>
-              </a:rPr>
-              <a:t>be</a:t>
-            </a:r>
-            <a:r>
-              <a:rPr lang="fr-FR" sz="1600" b="0" strike="noStrike" spc="-1" dirty="0">
-                <a:solidFill>
-                  <a:srgbClr val="000000"/>
-                </a:solidFill>
-                <a:latin typeface="Calibri"/>
-              </a:rPr>
-              <a:t> </a:t>
-            </a:r>
-            <a:r>
-              <a:rPr lang="fr-FR" sz="1600" b="0" strike="noStrike" spc="-1" dirty="0" err="1">
-                <a:solidFill>
-                  <a:srgbClr val="000000"/>
-                </a:solidFill>
-                <a:latin typeface="Calibri"/>
-              </a:rPr>
-              <a:t>used</a:t>
-            </a:r>
-            <a:r>
-              <a:rPr lang="fr-FR" sz="1600" b="0" strike="noStrike" spc="-1" dirty="0">
-                <a:solidFill>
-                  <a:srgbClr val="000000"/>
-                </a:solidFill>
-                <a:latin typeface="Calibri"/>
-              </a:rPr>
-              <a:t> to exit </a:t>
-            </a:r>
-            <a:r>
-              <a:rPr lang="fr-FR" sz="1600" b="0" strike="noStrike" spc="-1" dirty="0" err="1">
-                <a:solidFill>
-                  <a:srgbClr val="000000"/>
-                </a:solidFill>
-                <a:latin typeface="Calibri"/>
-              </a:rPr>
-              <a:t>any</a:t>
-            </a:r>
-            <a:r>
-              <a:rPr lang="fr-FR" sz="1600" b="0" strike="noStrike" spc="-1" dirty="0">
-                <a:solidFill>
-                  <a:srgbClr val="000000"/>
-                </a:solidFill>
-                <a:latin typeface="Calibri"/>
-              </a:rPr>
-              <a:t> </a:t>
-            </a:r>
-            <a:r>
-              <a:rPr lang="fr-FR" sz="1600" b="0" strike="noStrike" spc="-1" dirty="0" err="1">
-                <a:solidFill>
-                  <a:srgbClr val="000000"/>
-                </a:solidFill>
-                <a:latin typeface="Calibri"/>
-              </a:rPr>
-              <a:t>loop</a:t>
-            </a:r>
-            <a:r>
-              <a:rPr lang="fr-FR" sz="1600" b="0" strike="noStrike" spc="-1" dirty="0">
-                <a:solidFill>
-                  <a:srgbClr val="000000"/>
-                </a:solidFill>
-                <a:latin typeface="Calibri"/>
-              </a:rPr>
-              <a:t> </a:t>
-            </a:r>
-            <a:r>
-              <a:rPr lang="fr-FR" sz="1600" b="0" strike="noStrike" spc="-1" dirty="0" err="1">
-                <a:solidFill>
-                  <a:srgbClr val="000000"/>
-                </a:solidFill>
-                <a:latin typeface="Calibri"/>
-              </a:rPr>
-              <a:t>prematurely</a:t>
-            </a:r>
-            <a:endParaRPr lang="fr-FR" sz="1600" b="0" strike="noStrike" spc="-1" dirty="0">
+            <a:endParaRPr lang="en-IN" sz="1600" b="0" strike="noStrike" spc="-1">
               <a:solidFill>
                 <a:srgbClr val="000000"/>
               </a:solidFill>
@@ -8826,150 +8475,15 @@
               <a:buChar char=""/>
             </a:pPr>
             <a:r>
-              <a:rPr lang="fr-FR" sz="1600" b="0" strike="noStrike" spc="-1" dirty="0">
+              <a:rPr lang="en-IN" sz="1600" b="0" strike="noStrike" spc="-1">
                 <a:solidFill>
                   <a:srgbClr val="000000"/>
                 </a:solidFill>
                 <a:latin typeface="Calibri"/>
               </a:rPr>
-              <a:t>A 'continue' command can </a:t>
+              <a:t>A 'continue' command can be used to skip ahead to the next iterations without exiting the loop</a:t>
             </a:r>
-            <a:r>
-              <a:rPr lang="fr-FR" sz="1600" b="0" strike="noStrike" spc="-1" dirty="0" err="1">
-                <a:solidFill>
-                  <a:srgbClr val="000000"/>
-                </a:solidFill>
-                <a:latin typeface="Calibri"/>
-              </a:rPr>
-              <a:t>be</a:t>
-            </a:r>
-            <a:r>
-              <a:rPr lang="fr-FR" sz="1600" b="0" strike="noStrike" spc="-1" dirty="0">
-                <a:solidFill>
-                  <a:srgbClr val="000000"/>
-                </a:solidFill>
-                <a:latin typeface="Calibri"/>
-              </a:rPr>
-              <a:t> </a:t>
-            </a:r>
-            <a:r>
-              <a:rPr lang="fr-FR" sz="1600" b="0" strike="noStrike" spc="-1" dirty="0" err="1">
-                <a:solidFill>
-                  <a:srgbClr val="000000"/>
-                </a:solidFill>
-                <a:latin typeface="Calibri"/>
-              </a:rPr>
-              <a:t>used</a:t>
-            </a:r>
-            <a:r>
-              <a:rPr lang="fr-FR" sz="1600" b="0" strike="noStrike" spc="-1" dirty="0">
-                <a:solidFill>
-                  <a:srgbClr val="000000"/>
-                </a:solidFill>
-                <a:latin typeface="Calibri"/>
-              </a:rPr>
-              <a:t> to skip </a:t>
-            </a:r>
-            <a:r>
-              <a:rPr lang="fr-FR" sz="1600" b="0" strike="noStrike" spc="-1" dirty="0" err="1">
-                <a:solidFill>
-                  <a:srgbClr val="000000"/>
-                </a:solidFill>
-                <a:latin typeface="Calibri"/>
-              </a:rPr>
-              <a:t>ahead</a:t>
-            </a:r>
-            <a:r>
-              <a:rPr lang="fr-FR" sz="1600" b="0" strike="noStrike" spc="-1" dirty="0">
-                <a:solidFill>
-                  <a:srgbClr val="000000"/>
-                </a:solidFill>
-                <a:latin typeface="Calibri"/>
-              </a:rPr>
-              <a:t> to the </a:t>
-            </a:r>
-            <a:r>
-              <a:rPr lang="fr-FR" sz="1600" b="0" strike="noStrike" spc="-1" dirty="0" err="1">
-                <a:solidFill>
-                  <a:srgbClr val="000000"/>
-                </a:solidFill>
-                <a:latin typeface="Calibri"/>
-              </a:rPr>
-              <a:t>next</a:t>
-            </a:r>
-            <a:r>
-              <a:rPr lang="fr-FR" sz="1600" b="0" strike="noStrike" spc="-1" dirty="0">
-                <a:solidFill>
-                  <a:srgbClr val="000000"/>
-                </a:solidFill>
-                <a:latin typeface="Calibri"/>
-              </a:rPr>
-              <a:t> </a:t>
-            </a:r>
-            <a:r>
-              <a:rPr lang="fr-FR" sz="1600" b="0" strike="noStrike" spc="-1" dirty="0" err="1">
-                <a:solidFill>
-                  <a:srgbClr val="000000"/>
-                </a:solidFill>
-                <a:latin typeface="Calibri"/>
-              </a:rPr>
-              <a:t>iterations</a:t>
-            </a:r>
-            <a:r>
-              <a:rPr lang="fr-FR" sz="1600" b="0" strike="noStrike" spc="-1" dirty="0">
-                <a:solidFill>
-                  <a:srgbClr val="000000"/>
-                </a:solidFill>
-                <a:latin typeface="Calibri"/>
-              </a:rPr>
-              <a:t> </a:t>
-            </a:r>
-            <a:r>
-              <a:rPr lang="fr-FR" sz="1600" b="0" strike="noStrike" spc="-1" dirty="0" err="1">
-                <a:solidFill>
-                  <a:srgbClr val="000000"/>
-                </a:solidFill>
-                <a:latin typeface="Calibri"/>
-              </a:rPr>
-              <a:t>without</a:t>
-            </a:r>
-            <a:r>
-              <a:rPr lang="fr-FR" sz="1600" b="0" strike="noStrike" spc="-1" dirty="0">
-                <a:solidFill>
-                  <a:srgbClr val="000000"/>
-                </a:solidFill>
-                <a:latin typeface="Calibri"/>
-              </a:rPr>
-              <a:t> </a:t>
-            </a:r>
-            <a:r>
-              <a:rPr lang="fr-FR" sz="1600" b="0" strike="noStrike" spc="-1" dirty="0" err="1">
-                <a:solidFill>
-                  <a:srgbClr val="000000"/>
-                </a:solidFill>
-                <a:latin typeface="Calibri"/>
-              </a:rPr>
-              <a:t>exiting</a:t>
-            </a:r>
-            <a:r>
-              <a:rPr lang="fr-FR" sz="1600" b="0" strike="noStrike" spc="-1" dirty="0">
-                <a:solidFill>
-                  <a:srgbClr val="000000"/>
-                </a:solidFill>
-                <a:latin typeface="Calibri"/>
-              </a:rPr>
-              <a:t> the </a:t>
-            </a:r>
-            <a:r>
-              <a:rPr lang="fr-FR" sz="1600" b="0" strike="noStrike" spc="-1" dirty="0" err="1">
-                <a:solidFill>
-                  <a:srgbClr val="000000"/>
-                </a:solidFill>
-                <a:latin typeface="Calibri"/>
-              </a:rPr>
-              <a:t>loop</a:t>
-            </a:r>
-            <a:endParaRPr lang="fr-FR" sz="1600" b="0" strike="noStrike" spc="-1" dirty="0">
+            <a:endParaRPr lang="en-IN" sz="1600" b="0" strike="noStrike" spc="-1">
               <a:solidFill>
                 <a:srgbClr val="000000"/>
               </a:solidFill>
@@ -10164,7 +9678,7 @@
           <a:p>
             <a:pPr marL="360000" indent="-359640">
               <a:lnSpc>
-                <a:spcPct val="90000"/>
+                <a:spcPts val="2520"/>
               </a:lnSpc>
               <a:spcBef>
                 <a:spcPts val="400"/>
@@ -10176,25 +9690,20 @@
               <a:buChar char=""/>
             </a:pPr>
             <a:r>
-              <a:rPr lang="fr-FR" sz="2000" b="0" strike="noStrike" spc="-1">
+              <a:rPr lang="en-IN" sz="1600" b="0" strike="noStrike" spc="-1">
                 <a:solidFill>
                   <a:srgbClr val="000000"/>
                 </a:solidFill>
-                <a:latin typeface="Calibri"/>
+                <a:latin typeface="Calibri" panose="020F0502020204030204" pitchFamily="34" charset="0"/>
+                <a:cs typeface="Calibri" panose="020F0502020204030204" pitchFamily="34" charset="0"/>
               </a:rPr>
               <a:t>Simplicity</a:t>
             </a:r>
-            <a:endParaRPr lang="fr-FR" sz="2000" b="0" strike="noStrike" spc="-1">
-              <a:solidFill>
-                <a:srgbClr val="000000"/>
-              </a:solidFill>
-              <a:latin typeface="Gill Sans MT"/>
-            </a:endParaRPr>
           </a:p>
           <a:p>
             <a:pPr marL="759960" lvl="2" indent="-359640">
               <a:lnSpc>
-                <a:spcPct val="90000"/>
+                <a:spcPts val="2520"/>
               </a:lnSpc>
               <a:spcBef>
                 <a:spcPts val="360"/>
@@ -10206,25 +9715,20 @@
               <a:buChar char=""/>
             </a:pPr>
             <a:r>
-              <a:rPr lang="fr-FR" sz="1800" b="0" strike="noStrike" spc="-1">
+              <a:rPr lang="en-IN" sz="1600" b="0" strike="noStrike" spc="-1">
                 <a:solidFill>
                   <a:srgbClr val="000000"/>
                 </a:solidFill>
-                <a:latin typeface="Calibri"/>
+                <a:latin typeface="Calibri" panose="020F0502020204030204" pitchFamily="34" charset="0"/>
+                <a:cs typeface="Calibri" panose="020F0502020204030204" pitchFamily="34" charset="0"/>
               </a:rPr>
               <a:t>High level language built on C</a:t>
             </a:r>
-            <a:endParaRPr lang="fr-FR" sz="1800" b="0" strike="noStrike" spc="-1">
-              <a:solidFill>
-                <a:srgbClr val="000000"/>
-              </a:solidFill>
-              <a:latin typeface="Gill Sans MT"/>
-            </a:endParaRPr>
           </a:p>
           <a:p>
             <a:pPr marL="759960" lvl="2" indent="-359640">
               <a:lnSpc>
-                <a:spcPct val="90000"/>
+                <a:spcPts val="2520"/>
               </a:lnSpc>
               <a:spcBef>
                 <a:spcPts val="360"/>
@@ -10236,25 +9740,20 @@
               <a:buChar char=""/>
             </a:pPr>
             <a:r>
-              <a:rPr lang="fr-FR" sz="1800" b="0" strike="noStrike" spc="-1">
+              <a:rPr lang="en-IN" sz="1600" b="0" strike="noStrike" spc="-1">
                 <a:solidFill>
                   <a:srgbClr val="000000"/>
                 </a:solidFill>
-                <a:latin typeface="Calibri"/>
+                <a:latin typeface="Calibri" panose="020F0502020204030204" pitchFamily="34" charset="0"/>
+                <a:cs typeface="Calibri" panose="020F0502020204030204" pitchFamily="34" charset="0"/>
               </a:rPr>
               <a:t>Benefits of being high level and at the same time provides for CPU-efficient code</a:t>
             </a:r>
-            <a:endParaRPr lang="fr-FR" sz="1800" b="0" strike="noStrike" spc="-1">
-              <a:solidFill>
-                <a:srgbClr val="000000"/>
-              </a:solidFill>
-              <a:latin typeface="Gill Sans MT"/>
-            </a:endParaRPr>
           </a:p>
           <a:p>
             <a:pPr marL="360000" indent="-359640">
               <a:lnSpc>
-                <a:spcPct val="90000"/>
+                <a:spcPts val="2520"/>
               </a:lnSpc>
               <a:spcBef>
                 <a:spcPts val="400"/>
@@ -10266,25 +9765,20 @@
               <a:buChar char=""/>
             </a:pPr>
             <a:r>
-              <a:rPr lang="fr-FR" sz="2000" b="0" strike="noStrike" spc="-1">
+              <a:rPr lang="en-IN" sz="1600" b="0" strike="noStrike" spc="-1">
                 <a:solidFill>
                   <a:srgbClr val="000000"/>
                 </a:solidFill>
-                <a:latin typeface="Calibri"/>
+                <a:latin typeface="Calibri" panose="020F0502020204030204" pitchFamily="34" charset="0"/>
+                <a:cs typeface="Calibri" panose="020F0502020204030204" pitchFamily="34" charset="0"/>
               </a:rPr>
               <a:t>Usability</a:t>
             </a:r>
-            <a:endParaRPr lang="fr-FR" sz="2000" b="0" strike="noStrike" spc="-1">
-              <a:solidFill>
-                <a:srgbClr val="000000"/>
-              </a:solidFill>
-              <a:latin typeface="Gill Sans MT"/>
-            </a:endParaRPr>
           </a:p>
           <a:p>
             <a:pPr marL="759960" lvl="2" indent="-359640">
               <a:lnSpc>
-                <a:spcPct val="90000"/>
+                <a:spcPts val="2520"/>
               </a:lnSpc>
               <a:spcBef>
                 <a:spcPts val="360"/>
@@ -10296,25 +9790,20 @@
               <a:buChar char=""/>
             </a:pPr>
             <a:r>
-              <a:rPr lang="fr-FR" sz="1800" b="0" strike="noStrike" spc="-1">
+              <a:rPr lang="en-IN" sz="1600" b="0" strike="noStrike" spc="-1">
                 <a:solidFill>
                   <a:srgbClr val="000000"/>
                 </a:solidFill>
-                <a:latin typeface="Calibri"/>
+                <a:latin typeface="Calibri" panose="020F0502020204030204" pitchFamily="34" charset="0"/>
+                <a:cs typeface="Calibri" panose="020F0502020204030204" pitchFamily="34" charset="0"/>
               </a:rPr>
               <a:t>Lots of documentation</a:t>
             </a:r>
-            <a:endParaRPr lang="fr-FR" sz="1800" b="0" strike="noStrike" spc="-1">
-              <a:solidFill>
-                <a:srgbClr val="000000"/>
-              </a:solidFill>
-              <a:latin typeface="Gill Sans MT"/>
-            </a:endParaRPr>
           </a:p>
           <a:p>
             <a:pPr marL="759960" lvl="2" indent="-359640">
               <a:lnSpc>
-                <a:spcPct val="90000"/>
+                <a:spcPts val="2520"/>
               </a:lnSpc>
               <a:spcBef>
                 <a:spcPts val="360"/>
@@ -10326,25 +9815,20 @@
               <a:buChar char=""/>
             </a:pPr>
             <a:r>
-              <a:rPr lang="fr-FR" sz="1800" b="0" strike="noStrike" spc="-1">
+              <a:rPr lang="en-IN" sz="1600" b="0" strike="noStrike" spc="-1">
                 <a:solidFill>
                   <a:srgbClr val="000000"/>
                 </a:solidFill>
-                <a:latin typeface="Calibri"/>
+                <a:latin typeface="Calibri" panose="020F0502020204030204" pitchFamily="34" charset="0"/>
+                <a:cs typeface="Calibri" panose="020F0502020204030204" pitchFamily="34" charset="0"/>
               </a:rPr>
               <a:t>Active development community to answer questions - stackexchange</a:t>
             </a:r>
-            <a:endParaRPr lang="fr-FR" sz="1800" b="0" strike="noStrike" spc="-1">
-              <a:solidFill>
-                <a:srgbClr val="000000"/>
-              </a:solidFill>
-              <a:latin typeface="Gill Sans MT"/>
-            </a:endParaRPr>
           </a:p>
           <a:p>
             <a:pPr marL="360000" indent="-359640">
               <a:lnSpc>
-                <a:spcPct val="90000"/>
+                <a:spcPts val="2520"/>
               </a:lnSpc>
               <a:spcBef>
                 <a:spcPts val="400"/>
@@ -10356,25 +9840,20 @@
               <a:buChar char=""/>
             </a:pPr>
             <a:r>
-              <a:rPr lang="fr-FR" sz="2000" b="0" strike="noStrike" spc="-1">
+              <a:rPr lang="en-IN" sz="1600" b="0" strike="noStrike" spc="-1">
                 <a:solidFill>
                   <a:srgbClr val="000000"/>
                 </a:solidFill>
-                <a:latin typeface="Calibri"/>
+                <a:latin typeface="Calibri" panose="020F0502020204030204" pitchFamily="34" charset="0"/>
+                <a:cs typeface="Calibri" panose="020F0502020204030204" pitchFamily="34" charset="0"/>
               </a:rPr>
               <a:t>Extensibility</a:t>
             </a:r>
-            <a:endParaRPr lang="fr-FR" sz="2000" b="0" strike="noStrike" spc="-1">
-              <a:solidFill>
-                <a:srgbClr val="000000"/>
-              </a:solidFill>
-              <a:latin typeface="Gill Sans MT"/>
-            </a:endParaRPr>
           </a:p>
           <a:p>
             <a:pPr marL="759960" lvl="2" indent="-359640">
               <a:lnSpc>
-                <a:spcPct val="90000"/>
+                <a:spcPts val="2520"/>
               </a:lnSpc>
               <a:spcBef>
                 <a:spcPts val="360"/>
@@ -10386,25 +9865,20 @@
               <a:buChar char=""/>
             </a:pPr>
             <a:r>
-              <a:rPr lang="fr-FR" sz="1800" b="0" strike="noStrike" spc="-1">
+              <a:rPr lang="en-IN" sz="1600" b="0" strike="noStrike" spc="-1">
                 <a:solidFill>
                   <a:srgbClr val="000000"/>
                 </a:solidFill>
-                <a:latin typeface="Calibri"/>
+                <a:latin typeface="Calibri" panose="020F0502020204030204" pitchFamily="34" charset="0"/>
+                <a:cs typeface="Calibri" panose="020F0502020204030204" pitchFamily="34" charset="0"/>
               </a:rPr>
               <a:t>Small core language with a large standard library and an easily extensible interpreter</a:t>
             </a:r>
-            <a:endParaRPr lang="fr-FR" sz="1800" b="0" strike="noStrike" spc="-1">
-              <a:solidFill>
-                <a:srgbClr val="000000"/>
-              </a:solidFill>
-              <a:latin typeface="Gill Sans MT"/>
-            </a:endParaRPr>
           </a:p>
           <a:p>
             <a:pPr marL="759960" lvl="2" indent="-359640">
               <a:lnSpc>
-                <a:spcPct val="90000"/>
+                <a:spcPts val="2520"/>
               </a:lnSpc>
               <a:spcBef>
                 <a:spcPts val="360"/>
@@ -10416,20 +9890,15 @@
               <a:buChar char=""/>
             </a:pPr>
             <a:r>
-              <a:rPr lang="fr-FR" sz="1800" b="0" strike="noStrike" spc="-1">
+              <a:rPr lang="en-IN" sz="1600" b="0" strike="noStrike" spc="-1">
                 <a:solidFill>
                   <a:srgbClr val="000000"/>
                 </a:solidFill>
-                <a:latin typeface="Calibri"/>
+                <a:latin typeface="Calibri" panose="020F0502020204030204" pitchFamily="34" charset="0"/>
+                <a:cs typeface="Calibri" panose="020F0502020204030204" pitchFamily="34" charset="0"/>
               </a:rPr>
               <a:t>Leverage OSS community by allowing for extensibility </a:t>
             </a:r>
-            <a:endParaRPr lang="fr-FR" sz="1800" b="0" strike="noStrike" spc="-1">
-              <a:solidFill>
-                <a:srgbClr val="000000"/>
-              </a:solidFill>
-              <a:latin typeface="Gill Sans MT"/>
-            </a:endParaRPr>
           </a:p>
         </p:txBody>
       </p:sp>
@@ -10594,7 +10063,7 @@
           <a:p>
             <a:pPr marL="360000" indent="-359640">
               <a:lnSpc>
-                <a:spcPct val="140000"/>
+                <a:spcPct val="150000"/>
               </a:lnSpc>
               <a:spcBef>
                 <a:spcPts val="400"/>
@@ -10606,22 +10075,24 @@
               <a:buChar char=""/>
             </a:pPr>
             <a:r>
-              <a:rPr lang="en-IN" sz="2000" b="0" strike="noStrike" spc="-1">
+              <a:rPr lang="en-IN" sz="1600" b="0" strike="noStrike" spc="-1" dirty="0">
                 <a:solidFill>
                   <a:srgbClr val="000000"/>
                 </a:solidFill>
-                <a:latin typeface="Calibri"/>
+                <a:latin typeface="Calibri" panose="020F0502020204030204" pitchFamily="34" charset="0"/>
+                <a:cs typeface="Calibri" panose="020F0502020204030204" pitchFamily="34" charset="0"/>
               </a:rPr>
               <a:t>Big data management using Python</a:t>
             </a:r>
-            <a:endParaRPr lang="en-IN" sz="2000" b="0" strike="noStrike" spc="-1">
-              <a:latin typeface="Arial"/>
+            <a:endParaRPr lang="en-IN" sz="1600" b="0" strike="noStrike" spc="-1" dirty="0">
+              <a:latin typeface="Calibri" panose="020F0502020204030204" pitchFamily="34" charset="0"/>
+              <a:cs typeface="Calibri" panose="020F0502020204030204" pitchFamily="34" charset="0"/>
             </a:endParaRPr>
           </a:p>
           <a:p>
             <a:pPr marL="759960" lvl="2" indent="-359640">
               <a:lnSpc>
-                <a:spcPct val="140000"/>
+                <a:spcPct val="150000"/>
               </a:lnSpc>
               <a:spcBef>
                 <a:spcPts val="360"/>
@@ -10633,22 +10104,24 @@
               <a:buChar char=""/>
             </a:pPr>
             <a:r>
-              <a:rPr lang="en-IN" sz="1800" b="0" strike="noStrike" spc="-1">
+              <a:rPr lang="en-IN" sz="1600" b="0" strike="noStrike" spc="-1" dirty="0">
                 <a:solidFill>
                   <a:srgbClr val="000000"/>
                 </a:solidFill>
-                <a:latin typeface="Calibri"/>
+                <a:latin typeface="Calibri" panose="020F0502020204030204" pitchFamily="34" charset="0"/>
+                <a:cs typeface="Calibri" panose="020F0502020204030204" pitchFamily="34" charset="0"/>
               </a:rPr>
               <a:t>CERN and Large Hadron Collider </a:t>
             </a:r>
-            <a:endParaRPr lang="en-IN" sz="1800" b="0" strike="noStrike" spc="-1">
-              <a:latin typeface="Arial"/>
+            <a:endParaRPr lang="en-IN" sz="1600" b="0" strike="noStrike" spc="-1" dirty="0">
+              <a:latin typeface="Calibri" panose="020F0502020204030204" pitchFamily="34" charset="0"/>
+              <a:cs typeface="Calibri" panose="020F0502020204030204" pitchFamily="34" charset="0"/>
             </a:endParaRPr>
           </a:p>
           <a:p>
             <a:pPr marL="759960" lvl="2" indent="-359640">
               <a:lnSpc>
-                <a:spcPct val="140000"/>
+                <a:spcPct val="150000"/>
               </a:lnSpc>
               <a:spcBef>
                 <a:spcPts val="360"/>
@@ -10660,22 +10133,24 @@
               <a:buChar char=""/>
             </a:pPr>
             <a:r>
-              <a:rPr lang="en-IN" sz="1800" b="0" strike="noStrike" spc="-1">
+              <a:rPr lang="en-IN" sz="1600" b="0" strike="noStrike" spc="-1" dirty="0">
                 <a:solidFill>
                   <a:srgbClr val="000000"/>
                 </a:solidFill>
-                <a:latin typeface="Calibri"/>
+                <a:latin typeface="Calibri" panose="020F0502020204030204" pitchFamily="34" charset="0"/>
+                <a:cs typeface="Calibri" panose="020F0502020204030204" pitchFamily="34" charset="0"/>
               </a:rPr>
               <a:t>Particle detector (Atlas)</a:t>
             </a:r>
-            <a:endParaRPr lang="en-IN" sz="1800" b="0" strike="noStrike" spc="-1">
-              <a:latin typeface="Arial"/>
+            <a:endParaRPr lang="en-IN" sz="1600" b="0" strike="noStrike" spc="-1" dirty="0">
+              <a:latin typeface="Calibri" panose="020F0502020204030204" pitchFamily="34" charset="0"/>
+              <a:cs typeface="Calibri" panose="020F0502020204030204" pitchFamily="34" charset="0"/>
             </a:endParaRPr>
           </a:p>
           <a:p>
             <a:pPr marL="759960" lvl="2" indent="-359640">
               <a:lnSpc>
-                <a:spcPct val="140000"/>
+                <a:spcPct val="150000"/>
               </a:lnSpc>
               <a:spcBef>
                 <a:spcPts val="360"/>
@@ -10687,22 +10162,24 @@
               <a:buChar char=""/>
             </a:pPr>
             <a:r>
-              <a:rPr lang="en-IN" sz="1800" b="0" strike="noStrike" spc="-1">
+              <a:rPr lang="en-IN" sz="1600" b="0" strike="noStrike" spc="-1" dirty="0">
                 <a:solidFill>
                   <a:srgbClr val="000000"/>
                 </a:solidFill>
-                <a:latin typeface="Calibri"/>
+                <a:latin typeface="Calibri" panose="020F0502020204030204" pitchFamily="34" charset="0"/>
+                <a:cs typeface="Calibri" panose="020F0502020204030204" pitchFamily="34" charset="0"/>
               </a:rPr>
               <a:t>Data equivalent to 100 Megapixel camera taking  40 million pictures a second</a:t>
             </a:r>
-            <a:endParaRPr lang="en-IN" sz="1800" b="0" strike="noStrike" spc="-1">
-              <a:latin typeface="Arial"/>
+            <a:endParaRPr lang="en-IN" sz="1600" b="0" strike="noStrike" spc="-1" dirty="0">
+              <a:latin typeface="Calibri" panose="020F0502020204030204" pitchFamily="34" charset="0"/>
+              <a:cs typeface="Calibri" panose="020F0502020204030204" pitchFamily="34" charset="0"/>
             </a:endParaRPr>
           </a:p>
           <a:p>
             <a:pPr marL="759960" lvl="2" indent="-359640">
               <a:lnSpc>
-                <a:spcPct val="140000"/>
+                <a:spcPct val="150000"/>
               </a:lnSpc>
               <a:spcBef>
                 <a:spcPts val="360"/>
@@ -10714,22 +10191,24 @@
               <a:buChar char=""/>
             </a:pPr>
             <a:r>
-              <a:rPr lang="en-IN" sz="1800" b="0" strike="noStrike" spc="-1">
+              <a:rPr lang="en-IN" sz="1600" b="0" strike="noStrike" spc="-1" dirty="0">
                 <a:solidFill>
                   <a:srgbClr val="000000"/>
                 </a:solidFill>
-                <a:latin typeface="Calibri"/>
+                <a:latin typeface="Calibri" panose="020F0502020204030204" pitchFamily="34" charset="0"/>
+                <a:cs typeface="Calibri" panose="020F0502020204030204" pitchFamily="34" charset="0"/>
               </a:rPr>
               <a:t>Needle in a haystack – couple quadrillion collisions to find 1000 collisions that results in Higgs Boson</a:t>
             </a:r>
-            <a:endParaRPr lang="en-IN" sz="1800" b="0" strike="noStrike" spc="-1">
-              <a:latin typeface="Arial"/>
+            <a:endParaRPr lang="en-IN" sz="1600" b="0" strike="noStrike" spc="-1" dirty="0">
+              <a:latin typeface="Calibri" panose="020F0502020204030204" pitchFamily="34" charset="0"/>
+              <a:cs typeface="Calibri" panose="020F0502020204030204" pitchFamily="34" charset="0"/>
             </a:endParaRPr>
           </a:p>
           <a:p>
             <a:pPr marL="759960" lvl="2" indent="-359640">
               <a:lnSpc>
-                <a:spcPct val="140000"/>
+                <a:spcPct val="150000"/>
               </a:lnSpc>
               <a:spcBef>
                 <a:spcPts val="360"/>
@@ -10741,16 +10220,18 @@
               <a:buChar char=""/>
             </a:pPr>
             <a:r>
-              <a:rPr lang="en-IN" sz="1800" b="0" strike="noStrike" spc="-1">
+              <a:rPr lang="en-IN" sz="1600" b="0" strike="noStrike" spc="-1" dirty="0">
                 <a:solidFill>
                   <a:srgbClr val="000000"/>
                 </a:solidFill>
-                <a:latin typeface="Calibri"/>
+                <a:latin typeface="Calibri" panose="020F0502020204030204" pitchFamily="34" charset="0"/>
+                <a:cs typeface="Calibri" panose="020F0502020204030204" pitchFamily="34" charset="0"/>
               </a:rPr>
               <a:t>Pre-process this stunning amount of data in real time and store only the relevant for further analysis</a:t>
             </a:r>
-            <a:endParaRPr lang="en-IN" sz="1800" b="0" strike="noStrike" spc="-1">
-              <a:latin typeface="Arial"/>
+            <a:endParaRPr lang="en-IN" sz="1600" b="0" strike="noStrike" spc="-1" dirty="0">
+              <a:latin typeface="Calibri" panose="020F0502020204030204" pitchFamily="34" charset="0"/>
+              <a:cs typeface="Calibri" panose="020F0502020204030204" pitchFamily="34" charset="0"/>
             </a:endParaRPr>
           </a:p>
         </p:txBody>
@@ -11625,141 +11106,15 @@
               <a:buChar char=""/>
             </a:pPr>
             <a:r>
-              <a:rPr lang="fr-FR" sz="1600" b="0" strike="noStrike" spc="-1" dirty="0">
+              <a:rPr lang="en-IN" sz="1600" b="0" strike="noStrike" spc="-1">
                 <a:solidFill>
                   <a:srgbClr val="000000"/>
                 </a:solidFill>
                 <a:latin typeface="Calibri"/>
               </a:rPr>
-              <a:t>Block of </a:t>
+              <a:t>Block of organized, reusable code that is used to perform a single, related action </a:t>
             </a:r>
-            <a:r>
-              <a:rPr lang="fr-FR" sz="1600" b="0" strike="noStrike" spc="-1" dirty="0" err="1">
-                <a:solidFill>
-                  <a:srgbClr val="000000"/>
-                </a:solidFill>
-                <a:latin typeface="Calibri"/>
-              </a:rPr>
-              <a:t>organized</a:t>
-            </a:r>
-            <a:r>
-              <a:rPr lang="fr-FR" sz="1600" b="0" strike="noStrike" spc="-1" dirty="0">
-                <a:solidFill>
-                  <a:srgbClr val="000000"/>
-                </a:solidFill>
-                <a:latin typeface="Calibri"/>
-              </a:rPr>
-              <a:t>, </a:t>
-            </a:r>
-            <a:r>
-              <a:rPr lang="fr-FR" sz="1600" b="0" strike="noStrike" spc="-1" dirty="0" err="1">
-                <a:solidFill>
-                  <a:srgbClr val="000000"/>
-                </a:solidFill>
-                <a:latin typeface="Calibri"/>
-              </a:rPr>
-              <a:t>reusable</a:t>
-            </a:r>
-            <a:r>
-              <a:rPr lang="fr-FR" sz="1600" b="0" strike="noStrike" spc="-1" dirty="0">
-                <a:solidFill>
-                  <a:srgbClr val="000000"/>
-                </a:solidFill>
-                <a:latin typeface="Calibri"/>
-              </a:rPr>
-              <a:t> code </a:t>
-            </a:r>
-            <a:r>
-              <a:rPr lang="fr-FR" sz="1600" b="0" strike="noStrike" spc="-1" dirty="0" err="1">
-                <a:solidFill>
-                  <a:srgbClr val="000000"/>
-                </a:solidFill>
-                <a:latin typeface="Calibri"/>
-              </a:rPr>
-              <a:t>that</a:t>
-            </a:r>
-            <a:r>
-              <a:rPr lang="fr-FR" sz="1600" b="0" strike="noStrike" spc="-1" dirty="0">
-                <a:solidFill>
-                  <a:srgbClr val="000000"/>
-                </a:solidFill>
-                <a:latin typeface="Calibri"/>
-              </a:rPr>
-              <a:t> </a:t>
-            </a:r>
-            <a:r>
-              <a:rPr lang="fr-FR" sz="1600" b="0" strike="noStrike" spc="-1" dirty="0" err="1">
-                <a:solidFill>
-                  <a:srgbClr val="000000"/>
-                </a:solidFill>
-                <a:latin typeface="Calibri"/>
-              </a:rPr>
-              <a:t>is</a:t>
-            </a:r>
-            <a:r>
-              <a:rPr lang="fr-FR" sz="1600" b="0" strike="noStrike" spc="-1" dirty="0">
-                <a:solidFill>
-                  <a:srgbClr val="000000"/>
-                </a:solidFill>
-                <a:latin typeface="Calibri"/>
-              </a:rPr>
-              <a:t> </a:t>
-            </a:r>
-            <a:r>
-              <a:rPr lang="fr-FR" sz="1600" b="0" strike="noStrike" spc="-1" dirty="0" err="1">
-                <a:solidFill>
-                  <a:srgbClr val="000000"/>
-                </a:solidFill>
-                <a:latin typeface="Calibri"/>
-              </a:rPr>
-              <a:t>used</a:t>
-            </a:r>
-            <a:r>
-              <a:rPr lang="fr-FR" sz="1600" b="0" strike="noStrike" spc="-1" dirty="0">
-                <a:solidFill>
-                  <a:srgbClr val="000000"/>
-                </a:solidFill>
-                <a:latin typeface="Calibri"/>
-              </a:rPr>
-              <a:t> to </a:t>
-            </a:r>
-            <a:r>
-              <a:rPr lang="fr-FR" sz="1600" b="0" strike="noStrike" spc="-1" dirty="0" err="1">
-                <a:solidFill>
-                  <a:srgbClr val="000000"/>
-                </a:solidFill>
-                <a:latin typeface="Calibri"/>
-              </a:rPr>
-              <a:t>perform</a:t>
-            </a:r>
-            <a:r>
-              <a:rPr lang="fr-FR" sz="1600" b="0" strike="noStrike" spc="-1" dirty="0">
-                <a:solidFill>
-                  <a:srgbClr val="000000"/>
-                </a:solidFill>
-                <a:latin typeface="Calibri"/>
-              </a:rPr>
-              <a:t> a single, </a:t>
-            </a:r>
-            <a:r>
-              <a:rPr lang="fr-FR" sz="1600" b="0" strike="noStrike" spc="-1" dirty="0" err="1">
-                <a:solidFill>
-                  <a:srgbClr val="000000"/>
-                </a:solidFill>
-                <a:latin typeface="Calibri"/>
-              </a:rPr>
-              <a:t>related</a:t>
-            </a:r>
-            <a:r>
-              <a:rPr lang="fr-FR" sz="1600" b="0" strike="noStrike" spc="-1" dirty="0">
-                <a:solidFill>
-                  <a:srgbClr val="000000"/>
-                </a:solidFill>
-                <a:latin typeface="Calibri"/>
-              </a:rPr>
-              <a:t> action </a:t>
-            </a:r>
-            <a:endParaRPr lang="fr-FR" sz="1600" b="0" strike="noStrike" spc="-1" dirty="0">
+            <a:endParaRPr lang="en-IN" sz="1600" b="0" strike="noStrike" spc="-1">
               <a:solidFill>
                 <a:srgbClr val="000000"/>
               </a:solidFill>
@@ -11781,114 +11136,15 @@
               <a:buChar char=""/>
             </a:pPr>
             <a:r>
-              <a:rPr lang="fr-FR" sz="1600" b="0" strike="noStrike" spc="-1" dirty="0" err="1">
+              <a:rPr lang="en-IN" sz="1600" b="0" strike="noStrike" spc="-1">
                 <a:solidFill>
                   <a:srgbClr val="000000"/>
                 </a:solidFill>
                 <a:latin typeface="Calibri"/>
               </a:rPr>
-              <a:t>Provide</a:t>
+              <a:t>Provide better modularity for your application and a high degree of code reusing </a:t>
             </a:r>
-            <a:r>
-              <a:rPr lang="fr-FR" sz="1600" b="0" strike="noStrike" spc="-1" dirty="0">
-                <a:solidFill>
-                  <a:srgbClr val="000000"/>
-                </a:solidFill>
-                <a:latin typeface="Calibri"/>
-              </a:rPr>
-              <a:t> </a:t>
-            </a:r>
-            <a:r>
-              <a:rPr lang="fr-FR" sz="1600" b="0" strike="noStrike" spc="-1" dirty="0" err="1">
-                <a:solidFill>
-                  <a:srgbClr val="000000"/>
-                </a:solidFill>
-                <a:latin typeface="Calibri"/>
-              </a:rPr>
-              <a:t>better</a:t>
-            </a:r>
-            <a:r>
-              <a:rPr lang="fr-FR" sz="1600" b="0" strike="noStrike" spc="-1" dirty="0">
-                <a:solidFill>
-                  <a:srgbClr val="000000"/>
-                </a:solidFill>
-                <a:latin typeface="Calibri"/>
-              </a:rPr>
-              <a:t> </a:t>
-            </a:r>
-            <a:r>
-              <a:rPr lang="fr-FR" sz="1600" b="0" strike="noStrike" spc="-1" dirty="0" err="1">
-                <a:solidFill>
-                  <a:srgbClr val="000000"/>
-                </a:solidFill>
-                <a:latin typeface="Calibri"/>
-              </a:rPr>
-              <a:t>modularity</a:t>
-            </a:r>
-            <a:r>
-              <a:rPr lang="fr-FR" sz="1600" b="0" strike="noStrike" spc="-1" dirty="0">
-                <a:solidFill>
-                  <a:srgbClr val="000000"/>
-                </a:solidFill>
-                <a:latin typeface="Calibri"/>
-              </a:rPr>
-              <a:t> for </a:t>
-            </a:r>
-            <a:r>
-              <a:rPr lang="fr-FR" sz="1600" b="0" strike="noStrike" spc="-1" dirty="0" err="1">
-                <a:solidFill>
-                  <a:srgbClr val="000000"/>
-                </a:solidFill>
-                <a:latin typeface="Calibri"/>
-              </a:rPr>
-              <a:t>your</a:t>
-            </a:r>
-            <a:r>
-              <a:rPr lang="fr-FR" sz="1600" b="0" strike="noStrike" spc="-1" dirty="0">
-                <a:solidFill>
-                  <a:srgbClr val="000000"/>
-                </a:solidFill>
-                <a:latin typeface="Calibri"/>
-              </a:rPr>
-              <a:t> application and a high </a:t>
-            </a:r>
-            <a:r>
-              <a:rPr lang="fr-FR" sz="1600" b="0" strike="noStrike" spc="-1" dirty="0" err="1">
-                <a:solidFill>
-                  <a:srgbClr val="000000"/>
-                </a:solidFill>
-                <a:latin typeface="Calibri"/>
-              </a:rPr>
-              <a:t>degree</a:t>
-            </a:r>
-            <a:r>
-              <a:rPr lang="fr-FR" sz="1600" b="0" strike="noStrike" spc="-1" dirty="0">
-                <a:solidFill>
-                  <a:srgbClr val="000000"/>
-                </a:solidFill>
-                <a:latin typeface="Calibri"/>
-              </a:rPr>
-              <a:t> of code </a:t>
-            </a:r>
-            <a:r>
-              <a:rPr lang="fr-FR" sz="1600" b="0" strike="noStrike" spc="-1" dirty="0" err="1">
-                <a:solidFill>
-                  <a:srgbClr val="000000"/>
-                </a:solidFill>
-                <a:latin typeface="Calibri"/>
-              </a:rPr>
-              <a:t>reusing</a:t>
-            </a:r>
-            <a:r>
-              <a:rPr lang="fr-FR" sz="1600" b="0" strike="noStrike" spc="-1" dirty="0">
-                <a:solidFill>
-                  <a:srgbClr val="000000"/>
-                </a:solidFill>
-                <a:latin typeface="Calibri"/>
-              </a:rPr>
-              <a:t> </a:t>
-            </a:r>
-            <a:endParaRPr lang="fr-FR" sz="1600" b="0" strike="noStrike" spc="-1" dirty="0">
+            <a:endParaRPr lang="en-IN" sz="1600" b="0" strike="noStrike" spc="-1">
               <a:solidFill>
                 <a:srgbClr val="000000"/>
               </a:solidFill>
@@ -11910,141 +11166,15 @@
               <a:buChar char=""/>
             </a:pPr>
             <a:r>
-              <a:rPr lang="fr-FR" sz="1600" b="0" strike="noStrike" spc="-1" dirty="0">
+              <a:rPr lang="en-IN" sz="1600" b="0" strike="noStrike" spc="-1">
                 <a:solidFill>
                   <a:srgbClr val="000000"/>
                 </a:solidFill>
                 <a:latin typeface="Gill Sans"/>
               </a:rPr>
-              <a:t>Python </a:t>
+              <a:t>Python gives you many built-in functions like print(), len() etc..</a:t>
             </a:r>
-            <a:r>
-              <a:rPr lang="fr-FR" sz="1600" b="0" strike="noStrike" spc="-1" dirty="0" err="1">
-                <a:solidFill>
-                  <a:srgbClr val="000000"/>
-                </a:solidFill>
-                <a:latin typeface="Gill Sans"/>
-              </a:rPr>
-              <a:t>gives</a:t>
-            </a:r>
-            <a:r>
-              <a:rPr lang="fr-FR" sz="1600" b="0" strike="noStrike" spc="-1" dirty="0">
-                <a:solidFill>
-                  <a:srgbClr val="000000"/>
-                </a:solidFill>
-                <a:latin typeface="Gill Sans"/>
-              </a:rPr>
-              <a:t> </a:t>
-            </a:r>
-            <a:r>
-              <a:rPr lang="fr-FR" sz="1600" b="0" strike="noStrike" spc="-1" dirty="0" err="1">
-                <a:solidFill>
-                  <a:srgbClr val="000000"/>
-                </a:solidFill>
-                <a:latin typeface="Gill Sans"/>
-              </a:rPr>
-              <a:t>you</a:t>
-            </a:r>
-            <a:r>
-              <a:rPr lang="fr-FR" sz="1600" b="0" strike="noStrike" spc="-1" dirty="0">
-                <a:solidFill>
-                  <a:srgbClr val="000000"/>
-                </a:solidFill>
-                <a:latin typeface="Gill Sans"/>
-              </a:rPr>
-              <a:t> </a:t>
-            </a:r>
-            <a:r>
-              <a:rPr lang="fr-FR" sz="1600" b="0" strike="noStrike" spc="-1" dirty="0" err="1">
-                <a:solidFill>
-                  <a:srgbClr val="000000"/>
-                </a:solidFill>
-                <a:latin typeface="Gill Sans"/>
-              </a:rPr>
-              <a:t>many</a:t>
-            </a:r>
-            <a:r>
-              <a:rPr lang="fr-FR" sz="1600" b="0" strike="noStrike" spc="-1" dirty="0">
-                <a:solidFill>
-                  <a:srgbClr val="000000"/>
-                </a:solidFill>
-                <a:latin typeface="Gill Sans"/>
-              </a:rPr>
-              <a:t> </a:t>
-            </a:r>
-            <a:r>
-              <a:rPr lang="fr-FR" sz="1600" b="0" strike="noStrike" spc="-1" dirty="0" err="1">
-                <a:solidFill>
-                  <a:srgbClr val="000000"/>
-                </a:solidFill>
-                <a:latin typeface="Gill Sans"/>
-              </a:rPr>
-              <a:t>built-in</a:t>
-            </a:r>
-            <a:r>
-              <a:rPr lang="fr-FR" sz="1600" b="0" strike="noStrike" spc="-1" dirty="0">
-                <a:solidFill>
-                  <a:srgbClr val="000000"/>
-                </a:solidFill>
-                <a:latin typeface="Gill Sans"/>
-              </a:rPr>
-              <a:t> </a:t>
-            </a:r>
-            <a:r>
-              <a:rPr lang="fr-FR" sz="1600" b="0" strike="noStrike" spc="-1" dirty="0" err="1">
-                <a:solidFill>
-                  <a:srgbClr val="000000"/>
-                </a:solidFill>
-                <a:latin typeface="Gill Sans"/>
-              </a:rPr>
-              <a:t>functions</a:t>
-            </a:r>
-            <a:r>
-              <a:rPr lang="fr-FR" sz="1600" b="0" strike="noStrike" spc="-1" dirty="0">
-                <a:solidFill>
-                  <a:srgbClr val="000000"/>
-                </a:solidFill>
-                <a:latin typeface="Gill Sans"/>
-              </a:rPr>
-              <a:t> like </a:t>
-            </a:r>
-            <a:r>
-              <a:rPr lang="fr-FR" sz="1600" b="0" strike="noStrike" spc="-1" dirty="0" err="1">
-                <a:solidFill>
-                  <a:srgbClr val="000000"/>
-                </a:solidFill>
-                <a:latin typeface="Gill Sans"/>
-              </a:rPr>
-              <a:t>print</a:t>
-            </a:r>
-            <a:r>
-              <a:rPr lang="fr-FR" sz="1600" b="0" strike="noStrike" spc="-1" dirty="0">
-                <a:solidFill>
-                  <a:srgbClr val="000000"/>
-                </a:solidFill>
-                <a:latin typeface="Gill Sans"/>
-              </a:rPr>
-              <a:t>(), </a:t>
-            </a:r>
-            <a:r>
-              <a:rPr lang="fr-FR" sz="1600" b="0" strike="noStrike" spc="-1" dirty="0" err="1">
-                <a:solidFill>
-                  <a:srgbClr val="000000"/>
-                </a:solidFill>
-                <a:latin typeface="Gill Sans"/>
-              </a:rPr>
-              <a:t>len</a:t>
-            </a:r>
-            <a:r>
-              <a:rPr lang="fr-FR" sz="1600" b="0" strike="noStrike" spc="-1" dirty="0">
-                <a:solidFill>
-                  <a:srgbClr val="000000"/>
-                </a:solidFill>
-                <a:latin typeface="Gill Sans"/>
-              </a:rPr>
-              <a:t>() etc..</a:t>
-            </a:r>
-            <a:endParaRPr lang="fr-FR" sz="1600" b="0" strike="noStrike" spc="-1" dirty="0">
+            <a:endParaRPr lang="en-IN" sz="1600" b="0" strike="noStrike" spc="-1">
               <a:solidFill>
                 <a:srgbClr val="000000"/>
               </a:solidFill>
@@ -12066,96 +11196,15 @@
               <a:buChar char=""/>
             </a:pPr>
             <a:r>
-              <a:rPr lang="fr-FR" sz="1600" b="0" strike="noStrike" spc="-1" dirty="0">
+              <a:rPr lang="en-IN" sz="1600" b="0" strike="noStrike" spc="-1">
                 <a:solidFill>
                   <a:srgbClr val="000000"/>
                 </a:solidFill>
                 <a:latin typeface="Calibri"/>
               </a:rPr>
-              <a:t>It </a:t>
+              <a:t>It is also possible to define user-defined functions</a:t>
             </a:r>
-            <a:r>
-              <a:rPr lang="fr-FR" sz="1600" b="0" strike="noStrike" spc="-1" dirty="0" err="1">
-                <a:solidFill>
-                  <a:srgbClr val="000000"/>
-                </a:solidFill>
-                <a:latin typeface="Calibri"/>
-              </a:rPr>
-              <a:t>is</a:t>
-            </a:r>
-            <a:r>
-              <a:rPr lang="fr-FR" sz="1600" b="0" strike="noStrike" spc="-1" dirty="0">
-                <a:solidFill>
-                  <a:srgbClr val="000000"/>
-                </a:solidFill>
-                <a:latin typeface="Calibri"/>
-              </a:rPr>
-              <a:t> </a:t>
-            </a:r>
-            <a:r>
-              <a:rPr lang="fr-FR" sz="1600" b="0" strike="noStrike" spc="-1" dirty="0" err="1">
-                <a:solidFill>
-                  <a:srgbClr val="000000"/>
-                </a:solidFill>
-                <a:latin typeface="Calibri"/>
-              </a:rPr>
-              <a:t>also</a:t>
-            </a:r>
-            <a:r>
-              <a:rPr lang="fr-FR" sz="1600" b="0" strike="noStrike" spc="-1" dirty="0">
-                <a:solidFill>
-                  <a:srgbClr val="000000"/>
-                </a:solidFill>
-                <a:latin typeface="Calibri"/>
-              </a:rPr>
-              <a:t> possible to </a:t>
-            </a:r>
-            <a:r>
-              <a:rPr lang="fr-FR" sz="1600" b="0" strike="noStrike" spc="-1" dirty="0" err="1">
-                <a:solidFill>
-                  <a:srgbClr val="000000"/>
-                </a:solidFill>
-                <a:latin typeface="Calibri"/>
-              </a:rPr>
-              <a:t>define</a:t>
-            </a:r>
-            <a:r>
-              <a:rPr lang="fr-FR" sz="1600" b="0" strike="noStrike" spc="-1" dirty="0">
-                <a:solidFill>
-                  <a:srgbClr val="000000"/>
-                </a:solidFill>
-                <a:latin typeface="Calibri"/>
-              </a:rPr>
-              <a:t> user-</a:t>
-            </a:r>
-            <a:r>
-              <a:rPr lang="fr-FR" sz="1600" b="0" strike="noStrike" spc="-1" dirty="0" err="1">
-                <a:solidFill>
-                  <a:srgbClr val="000000"/>
-                </a:solidFill>
-                <a:latin typeface="Calibri"/>
-              </a:rPr>
-              <a:t>defined</a:t>
-            </a:r>
-            <a:r>
-              <a:rPr lang="fr-FR" sz="1600" b="0" strike="noStrike" spc="-1" dirty="0">
-                <a:solidFill>
-                  <a:srgbClr val="000000"/>
-                </a:solidFill>
-                <a:latin typeface="Calibri"/>
-              </a:rPr>
-              <a:t> </a:t>
-            </a:r>
-            <a:r>
-              <a:rPr lang="fr-FR" sz="1600" b="0" strike="noStrike" spc="-1" dirty="0" err="1">
-                <a:solidFill>
-                  <a:srgbClr val="000000"/>
-                </a:solidFill>
-                <a:latin typeface="Calibri"/>
-              </a:rPr>
-              <a:t>functions</a:t>
-            </a:r>
-            <a:endParaRPr lang="fr-FR" sz="1600" b="0" strike="noStrike" spc="-1" dirty="0">
+            <a:endParaRPr lang="en-IN" sz="1600" b="0" strike="noStrike" spc="-1">
               <a:solidFill>
                 <a:srgbClr val="000000"/>
               </a:solidFill>

</xml_diff>